<commit_message>
Update AI - Pengukuran Kualitas Air.2.pptx
</commit_message>
<xml_diff>
--- a/AI_akhir/AI - Pengukuran Kualitas Air.2.pptx
+++ b/AI_akhir/AI - Pengukuran Kualitas Air.2.pptx
@@ -182,7 +182,7 @@
           <p:cNvPr id="2" name="Title 1">
             <a:extLst>
               <a:ext uri="{FF2B5EF4-FFF2-40B4-BE49-F238E27FC236}">
-                <a16:creationId xmlns:a16="http://schemas.microsoft.com/office/drawing/2014/main" id="{565ABC80-82C1-A050-CD31-56A6744D7AD4}"/>
+                <a16:creationId xmlns:a16="http://schemas.microsoft.com/office/drawing/2014/main" xmlns="" id="{565ABC80-82C1-A050-CD31-56A6744D7AD4}"/>
               </a:ext>
             </a:extLst>
           </p:cNvPr>
@@ -220,7 +220,7 @@
           <p:cNvPr id="3" name="Subtitle 2">
             <a:extLst>
               <a:ext uri="{FF2B5EF4-FFF2-40B4-BE49-F238E27FC236}">
-                <a16:creationId xmlns:a16="http://schemas.microsoft.com/office/drawing/2014/main" id="{A4C420AE-BC78-447F-F0E2-05D8C1BBD4B9}"/>
+                <a16:creationId xmlns:a16="http://schemas.microsoft.com/office/drawing/2014/main" xmlns="" id="{A4C420AE-BC78-447F-F0E2-05D8C1BBD4B9}"/>
               </a:ext>
             </a:extLst>
           </p:cNvPr>
@@ -291,7 +291,7 @@
           <p:cNvPr id="4" name="Date Placeholder 3">
             <a:extLst>
               <a:ext uri="{FF2B5EF4-FFF2-40B4-BE49-F238E27FC236}">
-                <a16:creationId xmlns:a16="http://schemas.microsoft.com/office/drawing/2014/main" id="{75470618-C327-3119-0CF5-93B4102DBE21}"/>
+                <a16:creationId xmlns:a16="http://schemas.microsoft.com/office/drawing/2014/main" xmlns="" id="{75470618-C327-3119-0CF5-93B4102DBE21}"/>
               </a:ext>
             </a:extLst>
           </p:cNvPr>
@@ -320,7 +320,7 @@
           <p:cNvPr id="5" name="Footer Placeholder 4">
             <a:extLst>
               <a:ext uri="{FF2B5EF4-FFF2-40B4-BE49-F238E27FC236}">
-                <a16:creationId xmlns:a16="http://schemas.microsoft.com/office/drawing/2014/main" id="{145CC120-3200-0610-D967-4F3DB9021FF6}"/>
+                <a16:creationId xmlns:a16="http://schemas.microsoft.com/office/drawing/2014/main" xmlns="" id="{145CC120-3200-0610-D967-4F3DB9021FF6}"/>
               </a:ext>
             </a:extLst>
           </p:cNvPr>
@@ -345,7 +345,7 @@
           <p:cNvPr id="6" name="Slide Number Placeholder 5">
             <a:extLst>
               <a:ext uri="{FF2B5EF4-FFF2-40B4-BE49-F238E27FC236}">
-                <a16:creationId xmlns:a16="http://schemas.microsoft.com/office/drawing/2014/main" id="{7F155FD3-4CFE-E2AA-5E04-824E13459F15}"/>
+                <a16:creationId xmlns:a16="http://schemas.microsoft.com/office/drawing/2014/main" xmlns="" id="{7F155FD3-4CFE-E2AA-5E04-824E13459F15}"/>
               </a:ext>
             </a:extLst>
           </p:cNvPr>
@@ -404,7 +404,7 @@
           <p:cNvPr id="2" name="Title 1">
             <a:extLst>
               <a:ext uri="{FF2B5EF4-FFF2-40B4-BE49-F238E27FC236}">
-                <a16:creationId xmlns:a16="http://schemas.microsoft.com/office/drawing/2014/main" id="{454843B0-DBED-BF89-1ACA-D5BBDF44AD84}"/>
+                <a16:creationId xmlns:a16="http://schemas.microsoft.com/office/drawing/2014/main" xmlns="" id="{454843B0-DBED-BF89-1ACA-D5BBDF44AD84}"/>
               </a:ext>
             </a:extLst>
           </p:cNvPr>
@@ -433,7 +433,7 @@
           <p:cNvPr id="3" name="Vertical Text Placeholder 2">
             <a:extLst>
               <a:ext uri="{FF2B5EF4-FFF2-40B4-BE49-F238E27FC236}">
-                <a16:creationId xmlns:a16="http://schemas.microsoft.com/office/drawing/2014/main" id="{94D055D4-6E23-978D-F98B-59DEA7228BB6}"/>
+                <a16:creationId xmlns:a16="http://schemas.microsoft.com/office/drawing/2014/main" xmlns="" id="{94D055D4-6E23-978D-F98B-59DEA7228BB6}"/>
               </a:ext>
             </a:extLst>
           </p:cNvPr>
@@ -491,7 +491,7 @@
           <p:cNvPr id="4" name="Date Placeholder 3">
             <a:extLst>
               <a:ext uri="{FF2B5EF4-FFF2-40B4-BE49-F238E27FC236}">
-                <a16:creationId xmlns:a16="http://schemas.microsoft.com/office/drawing/2014/main" id="{576861E3-34C4-8EAC-01AF-91BD519458E2}"/>
+                <a16:creationId xmlns:a16="http://schemas.microsoft.com/office/drawing/2014/main" xmlns="" id="{576861E3-34C4-8EAC-01AF-91BD519458E2}"/>
               </a:ext>
             </a:extLst>
           </p:cNvPr>
@@ -520,7 +520,7 @@
           <p:cNvPr id="5" name="Footer Placeholder 4">
             <a:extLst>
               <a:ext uri="{FF2B5EF4-FFF2-40B4-BE49-F238E27FC236}">
-                <a16:creationId xmlns:a16="http://schemas.microsoft.com/office/drawing/2014/main" id="{8AC547B1-DD6B-E97F-80E9-F340367F1691}"/>
+                <a16:creationId xmlns:a16="http://schemas.microsoft.com/office/drawing/2014/main" xmlns="" id="{8AC547B1-DD6B-E97F-80E9-F340367F1691}"/>
               </a:ext>
             </a:extLst>
           </p:cNvPr>
@@ -545,7 +545,7 @@
           <p:cNvPr id="6" name="Slide Number Placeholder 5">
             <a:extLst>
               <a:ext uri="{FF2B5EF4-FFF2-40B4-BE49-F238E27FC236}">
-                <a16:creationId xmlns:a16="http://schemas.microsoft.com/office/drawing/2014/main" id="{88F13A7A-28C7-BF06-5BEA-5BAA2B228E7B}"/>
+                <a16:creationId xmlns:a16="http://schemas.microsoft.com/office/drawing/2014/main" xmlns="" id="{88F13A7A-28C7-BF06-5BEA-5BAA2B228E7B}"/>
               </a:ext>
             </a:extLst>
           </p:cNvPr>
@@ -604,7 +604,7 @@
           <p:cNvPr id="2" name="Vertical Title 1">
             <a:extLst>
               <a:ext uri="{FF2B5EF4-FFF2-40B4-BE49-F238E27FC236}">
-                <a16:creationId xmlns:a16="http://schemas.microsoft.com/office/drawing/2014/main" id="{E3D8A3C0-8096-D79E-7CB5-294484E220EA}"/>
+                <a16:creationId xmlns:a16="http://schemas.microsoft.com/office/drawing/2014/main" xmlns="" id="{E3D8A3C0-8096-D79E-7CB5-294484E220EA}"/>
               </a:ext>
             </a:extLst>
           </p:cNvPr>
@@ -638,7 +638,7 @@
           <p:cNvPr id="3" name="Vertical Text Placeholder 2">
             <a:extLst>
               <a:ext uri="{FF2B5EF4-FFF2-40B4-BE49-F238E27FC236}">
-                <a16:creationId xmlns:a16="http://schemas.microsoft.com/office/drawing/2014/main" id="{91351BAA-68A6-1FB8-C844-E99152ECA036}"/>
+                <a16:creationId xmlns:a16="http://schemas.microsoft.com/office/drawing/2014/main" xmlns="" id="{91351BAA-68A6-1FB8-C844-E99152ECA036}"/>
               </a:ext>
             </a:extLst>
           </p:cNvPr>
@@ -701,7 +701,7 @@
           <p:cNvPr id="4" name="Date Placeholder 3">
             <a:extLst>
               <a:ext uri="{FF2B5EF4-FFF2-40B4-BE49-F238E27FC236}">
-                <a16:creationId xmlns:a16="http://schemas.microsoft.com/office/drawing/2014/main" id="{E5B59C88-2C90-F524-00DB-E0A5F3FEF7D7}"/>
+                <a16:creationId xmlns:a16="http://schemas.microsoft.com/office/drawing/2014/main" xmlns="" id="{E5B59C88-2C90-F524-00DB-E0A5F3FEF7D7}"/>
               </a:ext>
             </a:extLst>
           </p:cNvPr>
@@ -730,7 +730,7 @@
           <p:cNvPr id="5" name="Footer Placeholder 4">
             <a:extLst>
               <a:ext uri="{FF2B5EF4-FFF2-40B4-BE49-F238E27FC236}">
-                <a16:creationId xmlns:a16="http://schemas.microsoft.com/office/drawing/2014/main" id="{37266F3F-CEB6-25C3-D3B1-25E601512397}"/>
+                <a16:creationId xmlns:a16="http://schemas.microsoft.com/office/drawing/2014/main" xmlns="" id="{37266F3F-CEB6-25C3-D3B1-25E601512397}"/>
               </a:ext>
             </a:extLst>
           </p:cNvPr>
@@ -755,7 +755,7 @@
           <p:cNvPr id="6" name="Slide Number Placeholder 5">
             <a:extLst>
               <a:ext uri="{FF2B5EF4-FFF2-40B4-BE49-F238E27FC236}">
-                <a16:creationId xmlns:a16="http://schemas.microsoft.com/office/drawing/2014/main" id="{3F04583F-74BD-B707-00D1-F437A09FD9E1}"/>
+                <a16:creationId xmlns:a16="http://schemas.microsoft.com/office/drawing/2014/main" xmlns="" id="{3F04583F-74BD-B707-00D1-F437A09FD9E1}"/>
               </a:ext>
             </a:extLst>
           </p:cNvPr>
@@ -814,7 +814,7 @@
           <p:cNvPr id="2" name="Title 1">
             <a:extLst>
               <a:ext uri="{FF2B5EF4-FFF2-40B4-BE49-F238E27FC236}">
-                <a16:creationId xmlns:a16="http://schemas.microsoft.com/office/drawing/2014/main" id="{FADC754A-DD15-A36E-E855-A1949D502D88}"/>
+                <a16:creationId xmlns:a16="http://schemas.microsoft.com/office/drawing/2014/main" xmlns="" id="{FADC754A-DD15-A36E-E855-A1949D502D88}"/>
               </a:ext>
             </a:extLst>
           </p:cNvPr>
@@ -843,7 +843,7 @@
           <p:cNvPr id="3" name="Content Placeholder 2">
             <a:extLst>
               <a:ext uri="{FF2B5EF4-FFF2-40B4-BE49-F238E27FC236}">
-                <a16:creationId xmlns:a16="http://schemas.microsoft.com/office/drawing/2014/main" id="{43AE14BF-4D43-EB22-6254-BC822B518D66}"/>
+                <a16:creationId xmlns:a16="http://schemas.microsoft.com/office/drawing/2014/main" xmlns="" id="{43AE14BF-4D43-EB22-6254-BC822B518D66}"/>
               </a:ext>
             </a:extLst>
           </p:cNvPr>
@@ -901,7 +901,7 @@
           <p:cNvPr id="4" name="Date Placeholder 3">
             <a:extLst>
               <a:ext uri="{FF2B5EF4-FFF2-40B4-BE49-F238E27FC236}">
-                <a16:creationId xmlns:a16="http://schemas.microsoft.com/office/drawing/2014/main" id="{A9281BCB-F1EE-9A59-9020-8ADC4E66B41E}"/>
+                <a16:creationId xmlns:a16="http://schemas.microsoft.com/office/drawing/2014/main" xmlns="" id="{A9281BCB-F1EE-9A59-9020-8ADC4E66B41E}"/>
               </a:ext>
             </a:extLst>
           </p:cNvPr>
@@ -930,7 +930,7 @@
           <p:cNvPr id="5" name="Footer Placeholder 4">
             <a:extLst>
               <a:ext uri="{FF2B5EF4-FFF2-40B4-BE49-F238E27FC236}">
-                <a16:creationId xmlns:a16="http://schemas.microsoft.com/office/drawing/2014/main" id="{2F8D26F7-010A-8DA1-A2B3-9CF4987C43EE}"/>
+                <a16:creationId xmlns:a16="http://schemas.microsoft.com/office/drawing/2014/main" xmlns="" id="{2F8D26F7-010A-8DA1-A2B3-9CF4987C43EE}"/>
               </a:ext>
             </a:extLst>
           </p:cNvPr>
@@ -955,7 +955,7 @@
           <p:cNvPr id="6" name="Slide Number Placeholder 5">
             <a:extLst>
               <a:ext uri="{FF2B5EF4-FFF2-40B4-BE49-F238E27FC236}">
-                <a16:creationId xmlns:a16="http://schemas.microsoft.com/office/drawing/2014/main" id="{56BE9407-A24C-CF07-773F-8D3F0D5218B5}"/>
+                <a16:creationId xmlns:a16="http://schemas.microsoft.com/office/drawing/2014/main" xmlns="" id="{56BE9407-A24C-CF07-773F-8D3F0D5218B5}"/>
               </a:ext>
             </a:extLst>
           </p:cNvPr>
@@ -1014,7 +1014,7 @@
           <p:cNvPr id="2" name="Title 1">
             <a:extLst>
               <a:ext uri="{FF2B5EF4-FFF2-40B4-BE49-F238E27FC236}">
-                <a16:creationId xmlns:a16="http://schemas.microsoft.com/office/drawing/2014/main" id="{3D92104C-49C5-A3E7-E7AB-7837624973BE}"/>
+                <a16:creationId xmlns:a16="http://schemas.microsoft.com/office/drawing/2014/main" xmlns="" id="{3D92104C-49C5-A3E7-E7AB-7837624973BE}"/>
               </a:ext>
             </a:extLst>
           </p:cNvPr>
@@ -1052,7 +1052,7 @@
           <p:cNvPr id="3" name="Text Placeholder 2">
             <a:extLst>
               <a:ext uri="{FF2B5EF4-FFF2-40B4-BE49-F238E27FC236}">
-                <a16:creationId xmlns:a16="http://schemas.microsoft.com/office/drawing/2014/main" id="{814A3D92-BE81-F67D-1E40-808ACB41ABB3}"/>
+                <a16:creationId xmlns:a16="http://schemas.microsoft.com/office/drawing/2014/main" xmlns="" id="{814A3D92-BE81-F67D-1E40-808ACB41ABB3}"/>
               </a:ext>
             </a:extLst>
           </p:cNvPr>
@@ -1177,7 +1177,7 @@
           <p:cNvPr id="4" name="Date Placeholder 3">
             <a:extLst>
               <a:ext uri="{FF2B5EF4-FFF2-40B4-BE49-F238E27FC236}">
-                <a16:creationId xmlns:a16="http://schemas.microsoft.com/office/drawing/2014/main" id="{30FD2C40-3C1B-CF5C-8513-C9C8DB5CB338}"/>
+                <a16:creationId xmlns:a16="http://schemas.microsoft.com/office/drawing/2014/main" xmlns="" id="{30FD2C40-3C1B-CF5C-8513-C9C8DB5CB338}"/>
               </a:ext>
             </a:extLst>
           </p:cNvPr>
@@ -1206,7 +1206,7 @@
           <p:cNvPr id="5" name="Footer Placeholder 4">
             <a:extLst>
               <a:ext uri="{FF2B5EF4-FFF2-40B4-BE49-F238E27FC236}">
-                <a16:creationId xmlns:a16="http://schemas.microsoft.com/office/drawing/2014/main" id="{743489F8-5552-BA9F-2E31-691BE98373E1}"/>
+                <a16:creationId xmlns:a16="http://schemas.microsoft.com/office/drawing/2014/main" xmlns="" id="{743489F8-5552-BA9F-2E31-691BE98373E1}"/>
               </a:ext>
             </a:extLst>
           </p:cNvPr>
@@ -1231,7 +1231,7 @@
           <p:cNvPr id="6" name="Slide Number Placeholder 5">
             <a:extLst>
               <a:ext uri="{FF2B5EF4-FFF2-40B4-BE49-F238E27FC236}">
-                <a16:creationId xmlns:a16="http://schemas.microsoft.com/office/drawing/2014/main" id="{25811CDC-5548-2BA3-683C-14E1CD01AE0A}"/>
+                <a16:creationId xmlns:a16="http://schemas.microsoft.com/office/drawing/2014/main" xmlns="" id="{25811CDC-5548-2BA3-683C-14E1CD01AE0A}"/>
               </a:ext>
             </a:extLst>
           </p:cNvPr>
@@ -1290,7 +1290,7 @@
           <p:cNvPr id="2" name="Title 1">
             <a:extLst>
               <a:ext uri="{FF2B5EF4-FFF2-40B4-BE49-F238E27FC236}">
-                <a16:creationId xmlns:a16="http://schemas.microsoft.com/office/drawing/2014/main" id="{B2F14476-FEAB-0513-9B4A-2DC342533BC1}"/>
+                <a16:creationId xmlns:a16="http://schemas.microsoft.com/office/drawing/2014/main" xmlns="" id="{B2F14476-FEAB-0513-9B4A-2DC342533BC1}"/>
               </a:ext>
             </a:extLst>
           </p:cNvPr>
@@ -1319,7 +1319,7 @@
           <p:cNvPr id="3" name="Content Placeholder 2">
             <a:extLst>
               <a:ext uri="{FF2B5EF4-FFF2-40B4-BE49-F238E27FC236}">
-                <a16:creationId xmlns:a16="http://schemas.microsoft.com/office/drawing/2014/main" id="{1D4D32D0-829C-93DE-B5EE-9D53D577FDBE}"/>
+                <a16:creationId xmlns:a16="http://schemas.microsoft.com/office/drawing/2014/main" xmlns="" id="{1D4D32D0-829C-93DE-B5EE-9D53D577FDBE}"/>
               </a:ext>
             </a:extLst>
           </p:cNvPr>
@@ -1382,7 +1382,7 @@
           <p:cNvPr id="4" name="Content Placeholder 3">
             <a:extLst>
               <a:ext uri="{FF2B5EF4-FFF2-40B4-BE49-F238E27FC236}">
-                <a16:creationId xmlns:a16="http://schemas.microsoft.com/office/drawing/2014/main" id="{A5787830-5AE1-315D-2CB9-1D4CB927EF82}"/>
+                <a16:creationId xmlns:a16="http://schemas.microsoft.com/office/drawing/2014/main" xmlns="" id="{A5787830-5AE1-315D-2CB9-1D4CB927EF82}"/>
               </a:ext>
             </a:extLst>
           </p:cNvPr>
@@ -1445,7 +1445,7 @@
           <p:cNvPr id="5" name="Date Placeholder 4">
             <a:extLst>
               <a:ext uri="{FF2B5EF4-FFF2-40B4-BE49-F238E27FC236}">
-                <a16:creationId xmlns:a16="http://schemas.microsoft.com/office/drawing/2014/main" id="{10C7F199-A0FD-8F97-6FE4-D6A721CB8012}"/>
+                <a16:creationId xmlns:a16="http://schemas.microsoft.com/office/drawing/2014/main" xmlns="" id="{10C7F199-A0FD-8F97-6FE4-D6A721CB8012}"/>
               </a:ext>
             </a:extLst>
           </p:cNvPr>
@@ -1474,7 +1474,7 @@
           <p:cNvPr id="6" name="Footer Placeholder 5">
             <a:extLst>
               <a:ext uri="{FF2B5EF4-FFF2-40B4-BE49-F238E27FC236}">
-                <a16:creationId xmlns:a16="http://schemas.microsoft.com/office/drawing/2014/main" id="{7A1F03C0-9668-7484-94DF-98124D1F3FBF}"/>
+                <a16:creationId xmlns:a16="http://schemas.microsoft.com/office/drawing/2014/main" xmlns="" id="{7A1F03C0-9668-7484-94DF-98124D1F3FBF}"/>
               </a:ext>
             </a:extLst>
           </p:cNvPr>
@@ -1499,7 +1499,7 @@
           <p:cNvPr id="7" name="Slide Number Placeholder 6">
             <a:extLst>
               <a:ext uri="{FF2B5EF4-FFF2-40B4-BE49-F238E27FC236}">
-                <a16:creationId xmlns:a16="http://schemas.microsoft.com/office/drawing/2014/main" id="{E5B3F1A3-0B42-1A53-E2CA-CF1BD0DE92DE}"/>
+                <a16:creationId xmlns:a16="http://schemas.microsoft.com/office/drawing/2014/main" xmlns="" id="{E5B3F1A3-0B42-1A53-E2CA-CF1BD0DE92DE}"/>
               </a:ext>
             </a:extLst>
           </p:cNvPr>
@@ -1558,7 +1558,7 @@
           <p:cNvPr id="2" name="Title 1">
             <a:extLst>
               <a:ext uri="{FF2B5EF4-FFF2-40B4-BE49-F238E27FC236}">
-                <a16:creationId xmlns:a16="http://schemas.microsoft.com/office/drawing/2014/main" id="{B2A90778-A283-FA4F-E3DC-9E616B975F31}"/>
+                <a16:creationId xmlns:a16="http://schemas.microsoft.com/office/drawing/2014/main" xmlns="" id="{B2A90778-A283-FA4F-E3DC-9E616B975F31}"/>
               </a:ext>
             </a:extLst>
           </p:cNvPr>
@@ -1592,7 +1592,7 @@
           <p:cNvPr id="3" name="Text Placeholder 2">
             <a:extLst>
               <a:ext uri="{FF2B5EF4-FFF2-40B4-BE49-F238E27FC236}">
-                <a16:creationId xmlns:a16="http://schemas.microsoft.com/office/drawing/2014/main" id="{23C2831A-2BFA-8164-0DF1-4BFDDCDE68AA}"/>
+                <a16:creationId xmlns:a16="http://schemas.microsoft.com/office/drawing/2014/main" xmlns="" id="{23C2831A-2BFA-8164-0DF1-4BFDDCDE68AA}"/>
               </a:ext>
             </a:extLst>
           </p:cNvPr>
@@ -1663,7 +1663,7 @@
           <p:cNvPr id="4" name="Content Placeholder 3">
             <a:extLst>
               <a:ext uri="{FF2B5EF4-FFF2-40B4-BE49-F238E27FC236}">
-                <a16:creationId xmlns:a16="http://schemas.microsoft.com/office/drawing/2014/main" id="{C73CDE3F-9A01-44ED-5C5D-35C6A7F5B56A}"/>
+                <a16:creationId xmlns:a16="http://schemas.microsoft.com/office/drawing/2014/main" xmlns="" id="{C73CDE3F-9A01-44ED-5C5D-35C6A7F5B56A}"/>
               </a:ext>
             </a:extLst>
           </p:cNvPr>
@@ -1726,7 +1726,7 @@
           <p:cNvPr id="5" name="Text Placeholder 4">
             <a:extLst>
               <a:ext uri="{FF2B5EF4-FFF2-40B4-BE49-F238E27FC236}">
-                <a16:creationId xmlns:a16="http://schemas.microsoft.com/office/drawing/2014/main" id="{F03CFDED-FF47-091F-211F-ABE391D3975A}"/>
+                <a16:creationId xmlns:a16="http://schemas.microsoft.com/office/drawing/2014/main" xmlns="" id="{F03CFDED-FF47-091F-211F-ABE391D3975A}"/>
               </a:ext>
             </a:extLst>
           </p:cNvPr>
@@ -1797,7 +1797,7 @@
           <p:cNvPr id="6" name="Content Placeholder 5">
             <a:extLst>
               <a:ext uri="{FF2B5EF4-FFF2-40B4-BE49-F238E27FC236}">
-                <a16:creationId xmlns:a16="http://schemas.microsoft.com/office/drawing/2014/main" id="{8B239ACB-2BDD-32CC-699F-C7C7B99512DF}"/>
+                <a16:creationId xmlns:a16="http://schemas.microsoft.com/office/drawing/2014/main" xmlns="" id="{8B239ACB-2BDD-32CC-699F-C7C7B99512DF}"/>
               </a:ext>
             </a:extLst>
           </p:cNvPr>
@@ -1860,7 +1860,7 @@
           <p:cNvPr id="7" name="Date Placeholder 6">
             <a:extLst>
               <a:ext uri="{FF2B5EF4-FFF2-40B4-BE49-F238E27FC236}">
-                <a16:creationId xmlns:a16="http://schemas.microsoft.com/office/drawing/2014/main" id="{D69DE720-01E2-CE65-92E0-0D55C899C577}"/>
+                <a16:creationId xmlns:a16="http://schemas.microsoft.com/office/drawing/2014/main" xmlns="" id="{D69DE720-01E2-CE65-92E0-0D55C899C577}"/>
               </a:ext>
             </a:extLst>
           </p:cNvPr>
@@ -1889,7 +1889,7 @@
           <p:cNvPr id="8" name="Footer Placeholder 7">
             <a:extLst>
               <a:ext uri="{FF2B5EF4-FFF2-40B4-BE49-F238E27FC236}">
-                <a16:creationId xmlns:a16="http://schemas.microsoft.com/office/drawing/2014/main" id="{2AF9CB5D-163B-DA4D-BCA4-14D9E39041BE}"/>
+                <a16:creationId xmlns:a16="http://schemas.microsoft.com/office/drawing/2014/main" xmlns="" id="{2AF9CB5D-163B-DA4D-BCA4-14D9E39041BE}"/>
               </a:ext>
             </a:extLst>
           </p:cNvPr>
@@ -1914,7 +1914,7 @@
           <p:cNvPr id="9" name="Slide Number Placeholder 8">
             <a:extLst>
               <a:ext uri="{FF2B5EF4-FFF2-40B4-BE49-F238E27FC236}">
-                <a16:creationId xmlns:a16="http://schemas.microsoft.com/office/drawing/2014/main" id="{B7E1BABE-1C40-056F-7D71-836B4EEBF2F9}"/>
+                <a16:creationId xmlns:a16="http://schemas.microsoft.com/office/drawing/2014/main" xmlns="" id="{B7E1BABE-1C40-056F-7D71-836B4EEBF2F9}"/>
               </a:ext>
             </a:extLst>
           </p:cNvPr>
@@ -1973,7 +1973,7 @@
           <p:cNvPr id="2" name="Title 1">
             <a:extLst>
               <a:ext uri="{FF2B5EF4-FFF2-40B4-BE49-F238E27FC236}">
-                <a16:creationId xmlns:a16="http://schemas.microsoft.com/office/drawing/2014/main" id="{60F04D39-A6B0-D2FD-9F1E-0B96D54DAF52}"/>
+                <a16:creationId xmlns:a16="http://schemas.microsoft.com/office/drawing/2014/main" xmlns="" id="{60F04D39-A6B0-D2FD-9F1E-0B96D54DAF52}"/>
               </a:ext>
             </a:extLst>
           </p:cNvPr>
@@ -2002,7 +2002,7 @@
           <p:cNvPr id="3" name="Date Placeholder 2">
             <a:extLst>
               <a:ext uri="{FF2B5EF4-FFF2-40B4-BE49-F238E27FC236}">
-                <a16:creationId xmlns:a16="http://schemas.microsoft.com/office/drawing/2014/main" id="{DB9A08DD-DA11-88BE-2819-8F8D71F444E0}"/>
+                <a16:creationId xmlns:a16="http://schemas.microsoft.com/office/drawing/2014/main" xmlns="" id="{DB9A08DD-DA11-88BE-2819-8F8D71F444E0}"/>
               </a:ext>
             </a:extLst>
           </p:cNvPr>
@@ -2031,7 +2031,7 @@
           <p:cNvPr id="4" name="Footer Placeholder 3">
             <a:extLst>
               <a:ext uri="{FF2B5EF4-FFF2-40B4-BE49-F238E27FC236}">
-                <a16:creationId xmlns:a16="http://schemas.microsoft.com/office/drawing/2014/main" id="{61D560E9-D431-22FB-7224-1BDA28ED9265}"/>
+                <a16:creationId xmlns:a16="http://schemas.microsoft.com/office/drawing/2014/main" xmlns="" id="{61D560E9-D431-22FB-7224-1BDA28ED9265}"/>
               </a:ext>
             </a:extLst>
           </p:cNvPr>
@@ -2056,7 +2056,7 @@
           <p:cNvPr id="5" name="Slide Number Placeholder 4">
             <a:extLst>
               <a:ext uri="{FF2B5EF4-FFF2-40B4-BE49-F238E27FC236}">
-                <a16:creationId xmlns:a16="http://schemas.microsoft.com/office/drawing/2014/main" id="{13B63EC0-1840-B525-5134-369D230277A8}"/>
+                <a16:creationId xmlns:a16="http://schemas.microsoft.com/office/drawing/2014/main" xmlns="" id="{13B63EC0-1840-B525-5134-369D230277A8}"/>
               </a:ext>
             </a:extLst>
           </p:cNvPr>
@@ -2115,7 +2115,7 @@
           <p:cNvPr id="2" name="Date Placeholder 1">
             <a:extLst>
               <a:ext uri="{FF2B5EF4-FFF2-40B4-BE49-F238E27FC236}">
-                <a16:creationId xmlns:a16="http://schemas.microsoft.com/office/drawing/2014/main" id="{7AF421CC-6DA1-0A5F-687E-B228D15299E9}"/>
+                <a16:creationId xmlns:a16="http://schemas.microsoft.com/office/drawing/2014/main" xmlns="" id="{7AF421CC-6DA1-0A5F-687E-B228D15299E9}"/>
               </a:ext>
             </a:extLst>
           </p:cNvPr>
@@ -2144,7 +2144,7 @@
           <p:cNvPr id="3" name="Footer Placeholder 2">
             <a:extLst>
               <a:ext uri="{FF2B5EF4-FFF2-40B4-BE49-F238E27FC236}">
-                <a16:creationId xmlns:a16="http://schemas.microsoft.com/office/drawing/2014/main" id="{FA56D8C5-238B-187C-FB4F-C64C35C55452}"/>
+                <a16:creationId xmlns:a16="http://schemas.microsoft.com/office/drawing/2014/main" xmlns="" id="{FA56D8C5-238B-187C-FB4F-C64C35C55452}"/>
               </a:ext>
             </a:extLst>
           </p:cNvPr>
@@ -2169,7 +2169,7 @@
           <p:cNvPr id="4" name="Slide Number Placeholder 3">
             <a:extLst>
               <a:ext uri="{FF2B5EF4-FFF2-40B4-BE49-F238E27FC236}">
-                <a16:creationId xmlns:a16="http://schemas.microsoft.com/office/drawing/2014/main" id="{A3CB5186-B253-50A3-DF71-2052368BB8E3}"/>
+                <a16:creationId xmlns:a16="http://schemas.microsoft.com/office/drawing/2014/main" xmlns="" id="{A3CB5186-B253-50A3-DF71-2052368BB8E3}"/>
               </a:ext>
             </a:extLst>
           </p:cNvPr>
@@ -2228,7 +2228,7 @@
           <p:cNvPr id="2" name="Title 1">
             <a:extLst>
               <a:ext uri="{FF2B5EF4-FFF2-40B4-BE49-F238E27FC236}">
-                <a16:creationId xmlns:a16="http://schemas.microsoft.com/office/drawing/2014/main" id="{7184619A-C3A2-4542-7197-8E902D7F0047}"/>
+                <a16:creationId xmlns:a16="http://schemas.microsoft.com/office/drawing/2014/main" xmlns="" id="{7184619A-C3A2-4542-7197-8E902D7F0047}"/>
               </a:ext>
             </a:extLst>
           </p:cNvPr>
@@ -2266,7 +2266,7 @@
           <p:cNvPr id="3" name="Content Placeholder 2">
             <a:extLst>
               <a:ext uri="{FF2B5EF4-FFF2-40B4-BE49-F238E27FC236}">
-                <a16:creationId xmlns:a16="http://schemas.microsoft.com/office/drawing/2014/main" id="{C48133D6-B08E-5A42-2CF5-76D7EE8997EC}"/>
+                <a16:creationId xmlns:a16="http://schemas.microsoft.com/office/drawing/2014/main" xmlns="" id="{C48133D6-B08E-5A42-2CF5-76D7EE8997EC}"/>
               </a:ext>
             </a:extLst>
           </p:cNvPr>
@@ -2357,7 +2357,7 @@
           <p:cNvPr id="4" name="Text Placeholder 3">
             <a:extLst>
               <a:ext uri="{FF2B5EF4-FFF2-40B4-BE49-F238E27FC236}">
-                <a16:creationId xmlns:a16="http://schemas.microsoft.com/office/drawing/2014/main" id="{5DCDE3D4-F2D2-EEE0-7D4A-BEC53745B0FE}"/>
+                <a16:creationId xmlns:a16="http://schemas.microsoft.com/office/drawing/2014/main" xmlns="" id="{5DCDE3D4-F2D2-EEE0-7D4A-BEC53745B0FE}"/>
               </a:ext>
             </a:extLst>
           </p:cNvPr>
@@ -2428,7 +2428,7 @@
           <p:cNvPr id="5" name="Date Placeholder 4">
             <a:extLst>
               <a:ext uri="{FF2B5EF4-FFF2-40B4-BE49-F238E27FC236}">
-                <a16:creationId xmlns:a16="http://schemas.microsoft.com/office/drawing/2014/main" id="{29E6BF73-287F-02F6-51DA-321F51E83D36}"/>
+                <a16:creationId xmlns:a16="http://schemas.microsoft.com/office/drawing/2014/main" xmlns="" id="{29E6BF73-287F-02F6-51DA-321F51E83D36}"/>
               </a:ext>
             </a:extLst>
           </p:cNvPr>
@@ -2457,7 +2457,7 @@
           <p:cNvPr id="6" name="Footer Placeholder 5">
             <a:extLst>
               <a:ext uri="{FF2B5EF4-FFF2-40B4-BE49-F238E27FC236}">
-                <a16:creationId xmlns:a16="http://schemas.microsoft.com/office/drawing/2014/main" id="{03A8A119-A027-DFEA-A726-467E93291D1A}"/>
+                <a16:creationId xmlns:a16="http://schemas.microsoft.com/office/drawing/2014/main" xmlns="" id="{03A8A119-A027-DFEA-A726-467E93291D1A}"/>
               </a:ext>
             </a:extLst>
           </p:cNvPr>
@@ -2482,7 +2482,7 @@
           <p:cNvPr id="7" name="Slide Number Placeholder 6">
             <a:extLst>
               <a:ext uri="{FF2B5EF4-FFF2-40B4-BE49-F238E27FC236}">
-                <a16:creationId xmlns:a16="http://schemas.microsoft.com/office/drawing/2014/main" id="{389EB483-C5B9-9676-61D6-1F6BF19065C3}"/>
+                <a16:creationId xmlns:a16="http://schemas.microsoft.com/office/drawing/2014/main" xmlns="" id="{389EB483-C5B9-9676-61D6-1F6BF19065C3}"/>
               </a:ext>
             </a:extLst>
           </p:cNvPr>
@@ -2541,7 +2541,7 @@
           <p:cNvPr id="2" name="Title 1">
             <a:extLst>
               <a:ext uri="{FF2B5EF4-FFF2-40B4-BE49-F238E27FC236}">
-                <a16:creationId xmlns:a16="http://schemas.microsoft.com/office/drawing/2014/main" id="{354F3E52-B1D0-DAF4-9C42-7A5784E8802D}"/>
+                <a16:creationId xmlns:a16="http://schemas.microsoft.com/office/drawing/2014/main" xmlns="" id="{354F3E52-B1D0-DAF4-9C42-7A5784E8802D}"/>
               </a:ext>
             </a:extLst>
           </p:cNvPr>
@@ -2579,7 +2579,7 @@
           <p:cNvPr id="3" name="Picture Placeholder 2">
             <a:extLst>
               <a:ext uri="{FF2B5EF4-FFF2-40B4-BE49-F238E27FC236}">
-                <a16:creationId xmlns:a16="http://schemas.microsoft.com/office/drawing/2014/main" id="{327ACAEB-2545-B084-3F20-2C4A1E0889BE}"/>
+                <a16:creationId xmlns:a16="http://schemas.microsoft.com/office/drawing/2014/main" xmlns="" id="{327ACAEB-2545-B084-3F20-2C4A1E0889BE}"/>
               </a:ext>
             </a:extLst>
           </p:cNvPr>
@@ -2646,7 +2646,7 @@
           <p:cNvPr id="4" name="Text Placeholder 3">
             <a:extLst>
               <a:ext uri="{FF2B5EF4-FFF2-40B4-BE49-F238E27FC236}">
-                <a16:creationId xmlns:a16="http://schemas.microsoft.com/office/drawing/2014/main" id="{9F44C3A4-235A-D129-F237-DB7D4D4553B0}"/>
+                <a16:creationId xmlns:a16="http://schemas.microsoft.com/office/drawing/2014/main" xmlns="" id="{9F44C3A4-235A-D129-F237-DB7D4D4553B0}"/>
               </a:ext>
             </a:extLst>
           </p:cNvPr>
@@ -2717,7 +2717,7 @@
           <p:cNvPr id="5" name="Date Placeholder 4">
             <a:extLst>
               <a:ext uri="{FF2B5EF4-FFF2-40B4-BE49-F238E27FC236}">
-                <a16:creationId xmlns:a16="http://schemas.microsoft.com/office/drawing/2014/main" id="{8C27DEE4-877F-D291-D3EF-505DC3103EA9}"/>
+                <a16:creationId xmlns:a16="http://schemas.microsoft.com/office/drawing/2014/main" xmlns="" id="{8C27DEE4-877F-D291-D3EF-505DC3103EA9}"/>
               </a:ext>
             </a:extLst>
           </p:cNvPr>
@@ -2746,7 +2746,7 @@
           <p:cNvPr id="6" name="Footer Placeholder 5">
             <a:extLst>
               <a:ext uri="{FF2B5EF4-FFF2-40B4-BE49-F238E27FC236}">
-                <a16:creationId xmlns:a16="http://schemas.microsoft.com/office/drawing/2014/main" id="{5E6E0A34-44E3-21D2-1D7E-1C5EAE9B822C}"/>
+                <a16:creationId xmlns:a16="http://schemas.microsoft.com/office/drawing/2014/main" xmlns="" id="{5E6E0A34-44E3-21D2-1D7E-1C5EAE9B822C}"/>
               </a:ext>
             </a:extLst>
           </p:cNvPr>
@@ -2771,7 +2771,7 @@
           <p:cNvPr id="7" name="Slide Number Placeholder 6">
             <a:extLst>
               <a:ext uri="{FF2B5EF4-FFF2-40B4-BE49-F238E27FC236}">
-                <a16:creationId xmlns:a16="http://schemas.microsoft.com/office/drawing/2014/main" id="{2FB6D2B6-1A93-0C20-3B6F-6D36FE30DFCA}"/>
+                <a16:creationId xmlns:a16="http://schemas.microsoft.com/office/drawing/2014/main" xmlns="" id="{2FB6D2B6-1A93-0C20-3B6F-6D36FE30DFCA}"/>
               </a:ext>
             </a:extLst>
           </p:cNvPr>
@@ -2835,7 +2835,7 @@
           <p:cNvPr id="2" name="Title Placeholder 1">
             <a:extLst>
               <a:ext uri="{FF2B5EF4-FFF2-40B4-BE49-F238E27FC236}">
-                <a16:creationId xmlns:a16="http://schemas.microsoft.com/office/drawing/2014/main" id="{FA4125AD-03D8-8F42-5A93-0A8C2A9F4FFE}"/>
+                <a16:creationId xmlns:a16="http://schemas.microsoft.com/office/drawing/2014/main" xmlns="" id="{FA4125AD-03D8-8F42-5A93-0A8C2A9F4FFE}"/>
               </a:ext>
             </a:extLst>
           </p:cNvPr>
@@ -2874,7 +2874,7 @@
           <p:cNvPr id="3" name="Text Placeholder 2">
             <a:extLst>
               <a:ext uri="{FF2B5EF4-FFF2-40B4-BE49-F238E27FC236}">
-                <a16:creationId xmlns:a16="http://schemas.microsoft.com/office/drawing/2014/main" id="{EDDC72E9-CE4B-34DB-F658-D7FACEB249C3}"/>
+                <a16:creationId xmlns:a16="http://schemas.microsoft.com/office/drawing/2014/main" xmlns="" id="{EDDC72E9-CE4B-34DB-F658-D7FACEB249C3}"/>
               </a:ext>
             </a:extLst>
           </p:cNvPr>
@@ -2942,7 +2942,7 @@
           <p:cNvPr id="4" name="Date Placeholder 3">
             <a:extLst>
               <a:ext uri="{FF2B5EF4-FFF2-40B4-BE49-F238E27FC236}">
-                <a16:creationId xmlns:a16="http://schemas.microsoft.com/office/drawing/2014/main" id="{E17EE434-A268-CB13-4863-D7BACFC395A0}"/>
+                <a16:creationId xmlns:a16="http://schemas.microsoft.com/office/drawing/2014/main" xmlns="" id="{E17EE434-A268-CB13-4863-D7BACFC395A0}"/>
               </a:ext>
             </a:extLst>
           </p:cNvPr>
@@ -2989,7 +2989,7 @@
           <p:cNvPr id="5" name="Footer Placeholder 4">
             <a:extLst>
               <a:ext uri="{FF2B5EF4-FFF2-40B4-BE49-F238E27FC236}">
-                <a16:creationId xmlns:a16="http://schemas.microsoft.com/office/drawing/2014/main" id="{6130943B-7C09-CF05-DC32-41DFE247E8C3}"/>
+                <a16:creationId xmlns:a16="http://schemas.microsoft.com/office/drawing/2014/main" xmlns="" id="{6130943B-7C09-CF05-DC32-41DFE247E8C3}"/>
               </a:ext>
             </a:extLst>
           </p:cNvPr>
@@ -3032,7 +3032,7 @@
           <p:cNvPr id="6" name="Slide Number Placeholder 5">
             <a:extLst>
               <a:ext uri="{FF2B5EF4-FFF2-40B4-BE49-F238E27FC236}">
-                <a16:creationId xmlns:a16="http://schemas.microsoft.com/office/drawing/2014/main" id="{F45C743C-C414-75AE-584E-B8A534B6EF48}"/>
+                <a16:creationId xmlns:a16="http://schemas.microsoft.com/office/drawing/2014/main" xmlns="" id="{F45C743C-C414-75AE-584E-B8A534B6EF48}"/>
               </a:ext>
             </a:extLst>
           </p:cNvPr>
@@ -3400,7 +3400,7 @@
           <p:cNvPr id="2" name="Title 1">
             <a:extLst>
               <a:ext uri="{FF2B5EF4-FFF2-40B4-BE49-F238E27FC236}">
-                <a16:creationId xmlns:a16="http://schemas.microsoft.com/office/drawing/2014/main" id="{D4D0A345-EAD6-40C8-067A-95EA43E75699}"/>
+                <a16:creationId xmlns:a16="http://schemas.microsoft.com/office/drawing/2014/main" xmlns="" id="{D4D0A345-EAD6-40C8-067A-95EA43E75699}"/>
               </a:ext>
             </a:extLst>
           </p:cNvPr>
@@ -3448,7 +3448,7 @@
           <p:cNvPr id="3" name="Subtitle 2">
             <a:extLst>
               <a:ext uri="{FF2B5EF4-FFF2-40B4-BE49-F238E27FC236}">
-                <a16:creationId xmlns:a16="http://schemas.microsoft.com/office/drawing/2014/main" id="{114AC3F9-A2EC-1D85-B80D-FEB7656413C8}"/>
+                <a16:creationId xmlns:a16="http://schemas.microsoft.com/office/drawing/2014/main" xmlns="" id="{114AC3F9-A2EC-1D85-B80D-FEB7656413C8}"/>
               </a:ext>
             </a:extLst>
           </p:cNvPr>
@@ -3502,7 +3502,7 @@
           <p:cNvPr id="4" name="Title 1">
             <a:extLst>
               <a:ext uri="{FF2B5EF4-FFF2-40B4-BE49-F238E27FC236}">
-                <a16:creationId xmlns:a16="http://schemas.microsoft.com/office/drawing/2014/main" id="{9A3F5ACE-98AD-8EDA-349D-0B074664D539}"/>
+                <a16:creationId xmlns:a16="http://schemas.microsoft.com/office/drawing/2014/main" xmlns="" id="{9A3F5ACE-98AD-8EDA-349D-0B074664D539}"/>
               </a:ext>
             </a:extLst>
           </p:cNvPr>
@@ -3557,7 +3557,7 @@
           <p:cNvPr id="1026" name="Picture 2" descr="Logo UKDW (Universitas Kristen Duta Wacana) - rekreartive">
             <a:extLst>
               <a:ext uri="{FF2B5EF4-FFF2-40B4-BE49-F238E27FC236}">
-                <a16:creationId xmlns:a16="http://schemas.microsoft.com/office/drawing/2014/main" id="{43F0D565-853E-B95A-E22A-9400D4722D85}"/>
+                <a16:creationId xmlns:a16="http://schemas.microsoft.com/office/drawing/2014/main" xmlns="" id="{43F0D565-853E-B95A-E22A-9400D4722D85}"/>
               </a:ext>
             </a:extLst>
           </p:cNvPr>
@@ -3567,7 +3567,7 @@
           <p:nvPr/>
         </p:nvPicPr>
         <p:blipFill>
-          <a:blip r:embed="rId2">
+          <a:blip r:embed="rId2" cstate="print">
             <a:extLst>
               <a:ext uri="{28A0092B-C50C-407E-A947-70E740481C1C}">
                 <a14:useLocalDpi xmlns:a14="http://schemas.microsoft.com/office/drawing/2010/main" val="0"/>
@@ -3604,7 +3604,7 @@
           <p:cNvPr id="1028" name="Picture 4" descr="Fakultas Teknologi Informasi | UKDW">
             <a:extLst>
               <a:ext uri="{FF2B5EF4-FFF2-40B4-BE49-F238E27FC236}">
-                <a16:creationId xmlns:a16="http://schemas.microsoft.com/office/drawing/2014/main" id="{8D38B4C9-E232-96F8-93B2-23085FDCE4A9}"/>
+                <a16:creationId xmlns:a16="http://schemas.microsoft.com/office/drawing/2014/main" xmlns="" id="{8D38B4C9-E232-96F8-93B2-23085FDCE4A9}"/>
               </a:ext>
             </a:extLst>
           </p:cNvPr>
@@ -3651,7 +3651,7 @@
           <p:cNvPr id="1030" name="Picture 6" descr="Informatika | UKDW">
             <a:extLst>
               <a:ext uri="{FF2B5EF4-FFF2-40B4-BE49-F238E27FC236}">
-                <a16:creationId xmlns:a16="http://schemas.microsoft.com/office/drawing/2014/main" id="{C66659E4-7141-931C-E8FB-EB46A649471F}"/>
+                <a16:creationId xmlns:a16="http://schemas.microsoft.com/office/drawing/2014/main" xmlns="" id="{C66659E4-7141-931C-E8FB-EB46A649471F}"/>
               </a:ext>
             </a:extLst>
           </p:cNvPr>
@@ -3661,7 +3661,7 @@
           <p:nvPr/>
         </p:nvPicPr>
         <p:blipFill>
-          <a:blip r:embed="rId4">
+          <a:blip r:embed="rId4" cstate="print">
             <a:extLst>
               <a:ext uri="{28A0092B-C50C-407E-A947-70E740481C1C}">
                 <a14:useLocalDpi xmlns:a14="http://schemas.microsoft.com/office/drawing/2010/main" val="0"/>
@@ -3728,7 +3728,7 @@
           <p:cNvPr id="2" name="Title 1">
             <a:extLst>
               <a:ext uri="{FF2B5EF4-FFF2-40B4-BE49-F238E27FC236}">
-                <a16:creationId xmlns:a16="http://schemas.microsoft.com/office/drawing/2014/main" id="{F7861D0F-642A-FDF9-3A44-F0467A57E39F}"/>
+                <a16:creationId xmlns:a16="http://schemas.microsoft.com/office/drawing/2014/main" xmlns="" id="{F7861D0F-642A-FDF9-3A44-F0467A57E39F}"/>
               </a:ext>
             </a:extLst>
           </p:cNvPr>
@@ -3757,7 +3757,7 @@
           <p:cNvPr id="3" name="Content Placeholder 2">
             <a:extLst>
               <a:ext uri="{FF2B5EF4-FFF2-40B4-BE49-F238E27FC236}">
-                <a16:creationId xmlns:a16="http://schemas.microsoft.com/office/drawing/2014/main" id="{F30A44D9-CFFF-F72C-5036-3FC094B14845}"/>
+                <a16:creationId xmlns:a16="http://schemas.microsoft.com/office/drawing/2014/main" xmlns="" id="{F30A44D9-CFFF-F72C-5036-3FC094B14845}"/>
               </a:ext>
             </a:extLst>
           </p:cNvPr>
@@ -4246,7 +4246,7 @@
           <p:cNvPr id="2" name="Title 1">
             <a:extLst>
               <a:ext uri="{FF2B5EF4-FFF2-40B4-BE49-F238E27FC236}">
-                <a16:creationId xmlns:a16="http://schemas.microsoft.com/office/drawing/2014/main" id="{677575C8-C333-DEAF-2405-36E5444CE64E}"/>
+                <a16:creationId xmlns:a16="http://schemas.microsoft.com/office/drawing/2014/main" xmlns="" id="{677575C8-C333-DEAF-2405-36E5444CE64E}"/>
               </a:ext>
             </a:extLst>
           </p:cNvPr>
@@ -4275,7 +4275,7 @@
           <p:cNvPr id="3" name="Content Placeholder 2">
             <a:extLst>
               <a:ext uri="{FF2B5EF4-FFF2-40B4-BE49-F238E27FC236}">
-                <a16:creationId xmlns:a16="http://schemas.microsoft.com/office/drawing/2014/main" id="{2890E81F-3B38-DAE8-22E1-4304F544DC3E}"/>
+                <a16:creationId xmlns:a16="http://schemas.microsoft.com/office/drawing/2014/main" xmlns="" id="{2890E81F-3B38-DAE8-22E1-4304F544DC3E}"/>
               </a:ext>
             </a:extLst>
           </p:cNvPr>
@@ -4331,7 +4331,7 @@
           <p:cNvPr id="5" name="Picture 4" descr="A screenshot of a computer&#10;&#10;Description automatically generated">
             <a:extLst>
               <a:ext uri="{FF2B5EF4-FFF2-40B4-BE49-F238E27FC236}">
-                <a16:creationId xmlns:a16="http://schemas.microsoft.com/office/drawing/2014/main" id="{329C099D-F75C-23E8-4B6C-9246861BFBB0}"/>
+                <a16:creationId xmlns:a16="http://schemas.microsoft.com/office/drawing/2014/main" xmlns="" id="{329C099D-F75C-23E8-4B6C-9246861BFBB0}"/>
               </a:ext>
             </a:extLst>
           </p:cNvPr>
@@ -4341,7 +4341,7 @@
           <p:nvPr/>
         </p:nvPicPr>
         <p:blipFill>
-          <a:blip r:embed="rId2">
+          <a:blip r:embed="rId2" cstate="print">
             <a:extLst>
               <a:ext uri="{28A0092B-C50C-407E-A947-70E740481C1C}">
                 <a14:useLocalDpi xmlns:a14="http://schemas.microsoft.com/office/drawing/2010/main" val="0"/>
@@ -4367,7 +4367,7 @@
           <p:cNvPr id="7" name="Picture 6" descr="A screenshot of a computer screen&#10;&#10;Description automatically generated">
             <a:extLst>
               <a:ext uri="{FF2B5EF4-FFF2-40B4-BE49-F238E27FC236}">
-                <a16:creationId xmlns:a16="http://schemas.microsoft.com/office/drawing/2014/main" id="{9C8E78E6-DD65-78D9-8ED6-6FA197CBE8BE}"/>
+                <a16:creationId xmlns:a16="http://schemas.microsoft.com/office/drawing/2014/main" xmlns="" id="{9C8E78E6-DD65-78D9-8ED6-6FA197CBE8BE}"/>
               </a:ext>
             </a:extLst>
           </p:cNvPr>
@@ -4433,7 +4433,7 @@
           <p:cNvPr id="2" name="Title 1">
             <a:extLst>
               <a:ext uri="{FF2B5EF4-FFF2-40B4-BE49-F238E27FC236}">
-                <a16:creationId xmlns:a16="http://schemas.microsoft.com/office/drawing/2014/main" id="{D9F7132D-C6B1-7183-E84D-6DF10E94A81D}"/>
+                <a16:creationId xmlns:a16="http://schemas.microsoft.com/office/drawing/2014/main" xmlns="" id="{D9F7132D-C6B1-7183-E84D-6DF10E94A81D}"/>
               </a:ext>
             </a:extLst>
           </p:cNvPr>
@@ -4462,7 +4462,7 @@
           <p:cNvPr id="3" name="Content Placeholder 2">
             <a:extLst>
               <a:ext uri="{FF2B5EF4-FFF2-40B4-BE49-F238E27FC236}">
-                <a16:creationId xmlns:a16="http://schemas.microsoft.com/office/drawing/2014/main" id="{A0FE34EF-933D-E206-920E-25E1569F8FFD}"/>
+                <a16:creationId xmlns:a16="http://schemas.microsoft.com/office/drawing/2014/main" xmlns="" id="{A0FE34EF-933D-E206-920E-25E1569F8FFD}"/>
               </a:ext>
             </a:extLst>
           </p:cNvPr>
@@ -4629,7 +4629,7 @@
           <p:cNvPr id="2" name="Title 1">
             <a:extLst>
               <a:ext uri="{FF2B5EF4-FFF2-40B4-BE49-F238E27FC236}">
-                <a16:creationId xmlns:a16="http://schemas.microsoft.com/office/drawing/2014/main" id="{29EC2349-E8FD-BAB3-7447-E70B5D7A87D8}"/>
+                <a16:creationId xmlns:a16="http://schemas.microsoft.com/office/drawing/2014/main" xmlns="" id="{29EC2349-E8FD-BAB3-7447-E70B5D7A87D8}"/>
               </a:ext>
             </a:extLst>
           </p:cNvPr>
@@ -4663,7 +4663,7 @@
           <p:cNvPr id="4" name="Google Shape;137;p3">
             <a:extLst>
               <a:ext uri="{FF2B5EF4-FFF2-40B4-BE49-F238E27FC236}">
-                <a16:creationId xmlns:a16="http://schemas.microsoft.com/office/drawing/2014/main" id="{F31ABDC4-045F-2D1B-C5AD-EB5606AC08A8}"/>
+                <a16:creationId xmlns:a16="http://schemas.microsoft.com/office/drawing/2014/main" xmlns="" id="{F31ABDC4-045F-2D1B-C5AD-EB5606AC08A8}"/>
               </a:ext>
             </a:extLst>
           </p:cNvPr>
@@ -4683,7 +4683,7 @@
             <p:cNvPr id="5" name="Google Shape;138;p3">
               <a:extLst>
                 <a:ext uri="{FF2B5EF4-FFF2-40B4-BE49-F238E27FC236}">
-                  <a16:creationId xmlns:a16="http://schemas.microsoft.com/office/drawing/2014/main" id="{9B47FCD6-EF81-7C1A-8621-5EB8130B953F}"/>
+                  <a16:creationId xmlns:a16="http://schemas.microsoft.com/office/drawing/2014/main" xmlns="" id="{9B47FCD6-EF81-7C1A-8621-5EB8130B953F}"/>
                 </a:ext>
               </a:extLst>
             </p:cNvPr>
@@ -4965,7 +4965,7 @@
             <p:cNvPr id="6" name="Google Shape;139;p3">
               <a:extLst>
                 <a:ext uri="{FF2B5EF4-FFF2-40B4-BE49-F238E27FC236}">
-                  <a16:creationId xmlns:a16="http://schemas.microsoft.com/office/drawing/2014/main" id="{51B61834-CB87-9D43-0553-F3B79610E62C}"/>
+                  <a16:creationId xmlns:a16="http://schemas.microsoft.com/office/drawing/2014/main" xmlns="" id="{51B61834-CB87-9D43-0553-F3B79610E62C}"/>
                 </a:ext>
               </a:extLst>
             </p:cNvPr>
@@ -5247,7 +5247,7 @@
             <p:cNvPr id="7" name="Google Shape;140;p3">
               <a:extLst>
                 <a:ext uri="{FF2B5EF4-FFF2-40B4-BE49-F238E27FC236}">
-                  <a16:creationId xmlns:a16="http://schemas.microsoft.com/office/drawing/2014/main" id="{9EF69B96-2860-AA0F-5C45-C1D42FFC549F}"/>
+                  <a16:creationId xmlns:a16="http://schemas.microsoft.com/office/drawing/2014/main" xmlns="" id="{9EF69B96-2860-AA0F-5C45-C1D42FFC549F}"/>
                 </a:ext>
               </a:extLst>
             </p:cNvPr>
@@ -5529,7 +5529,7 @@
             <p:cNvPr id="8" name="Google Shape;141;p3">
               <a:extLst>
                 <a:ext uri="{FF2B5EF4-FFF2-40B4-BE49-F238E27FC236}">
-                  <a16:creationId xmlns:a16="http://schemas.microsoft.com/office/drawing/2014/main" id="{80B0C810-7EF7-4410-508F-E4D1688AD2B4}"/>
+                  <a16:creationId xmlns:a16="http://schemas.microsoft.com/office/drawing/2014/main" xmlns="" id="{80B0C810-7EF7-4410-508F-E4D1688AD2B4}"/>
                 </a:ext>
               </a:extLst>
             </p:cNvPr>
@@ -5811,7 +5811,7 @@
             <p:cNvPr id="9" name="Google Shape;142;p3">
               <a:extLst>
                 <a:ext uri="{FF2B5EF4-FFF2-40B4-BE49-F238E27FC236}">
-                  <a16:creationId xmlns:a16="http://schemas.microsoft.com/office/drawing/2014/main" id="{4D6CF60F-1319-6FE7-C6EA-15FCD3906936}"/>
+                  <a16:creationId xmlns:a16="http://schemas.microsoft.com/office/drawing/2014/main" xmlns="" id="{4D6CF60F-1319-6FE7-C6EA-15FCD3906936}"/>
                 </a:ext>
               </a:extLst>
             </p:cNvPr>
@@ -6093,7 +6093,7 @@
             <p:cNvPr id="10" name="Google Shape;143;p3">
               <a:extLst>
                 <a:ext uri="{FF2B5EF4-FFF2-40B4-BE49-F238E27FC236}">
-                  <a16:creationId xmlns:a16="http://schemas.microsoft.com/office/drawing/2014/main" id="{1784C27D-2FE2-2B36-0CDF-77B447F76764}"/>
+                  <a16:creationId xmlns:a16="http://schemas.microsoft.com/office/drawing/2014/main" xmlns="" id="{1784C27D-2FE2-2B36-0CDF-77B447F76764}"/>
                 </a:ext>
               </a:extLst>
             </p:cNvPr>
@@ -6181,7 +6181,7 @@
             <p:cNvPr id="11" name="Google Shape;144;p3">
               <a:extLst>
                 <a:ext uri="{FF2B5EF4-FFF2-40B4-BE49-F238E27FC236}">
-                  <a16:creationId xmlns:a16="http://schemas.microsoft.com/office/drawing/2014/main" id="{E0A4E4B1-C53A-8E43-C47C-EE1CBD07CB8D}"/>
+                  <a16:creationId xmlns:a16="http://schemas.microsoft.com/office/drawing/2014/main" xmlns="" id="{E0A4E4B1-C53A-8E43-C47C-EE1CBD07CB8D}"/>
                 </a:ext>
               </a:extLst>
             </p:cNvPr>
@@ -6269,7 +6269,7 @@
             <p:cNvPr id="12" name="Google Shape;145;p3">
               <a:extLst>
                 <a:ext uri="{FF2B5EF4-FFF2-40B4-BE49-F238E27FC236}">
-                  <a16:creationId xmlns:a16="http://schemas.microsoft.com/office/drawing/2014/main" id="{309A08CA-E950-4C16-DE1E-2A2FFAF580BE}"/>
+                  <a16:creationId xmlns:a16="http://schemas.microsoft.com/office/drawing/2014/main" xmlns="" id="{309A08CA-E950-4C16-DE1E-2A2FFAF580BE}"/>
                 </a:ext>
               </a:extLst>
             </p:cNvPr>
@@ -6345,7 +6345,7 @@
             <p:cNvPr id="13" name="Google Shape;146;p3">
               <a:extLst>
                 <a:ext uri="{FF2B5EF4-FFF2-40B4-BE49-F238E27FC236}">
-                  <a16:creationId xmlns:a16="http://schemas.microsoft.com/office/drawing/2014/main" id="{DCC2D7C5-611B-29E6-05E5-0D68F6B28D1B}"/>
+                  <a16:creationId xmlns:a16="http://schemas.microsoft.com/office/drawing/2014/main" xmlns="" id="{DCC2D7C5-611B-29E6-05E5-0D68F6B28D1B}"/>
                 </a:ext>
               </a:extLst>
             </p:cNvPr>
@@ -6421,7 +6421,7 @@
             <p:cNvPr id="14" name="Google Shape;147;p3">
               <a:extLst>
                 <a:ext uri="{FF2B5EF4-FFF2-40B4-BE49-F238E27FC236}">
-                  <a16:creationId xmlns:a16="http://schemas.microsoft.com/office/drawing/2014/main" id="{4ED4107D-8148-A2F5-0DA0-C3D3F2E31203}"/>
+                  <a16:creationId xmlns:a16="http://schemas.microsoft.com/office/drawing/2014/main" xmlns="" id="{4ED4107D-8148-A2F5-0DA0-C3D3F2E31203}"/>
                 </a:ext>
               </a:extLst>
             </p:cNvPr>
@@ -6497,7 +6497,7 @@
             <p:cNvPr id="15" name="Google Shape;148;p3">
               <a:extLst>
                 <a:ext uri="{FF2B5EF4-FFF2-40B4-BE49-F238E27FC236}">
-                  <a16:creationId xmlns:a16="http://schemas.microsoft.com/office/drawing/2014/main" id="{2EE15F80-4AE4-2B82-4D92-F22142FBDDA9}"/>
+                  <a16:creationId xmlns:a16="http://schemas.microsoft.com/office/drawing/2014/main" xmlns="" id="{2EE15F80-4AE4-2B82-4D92-F22142FBDDA9}"/>
                 </a:ext>
               </a:extLst>
             </p:cNvPr>
@@ -6779,7 +6779,7 @@
             <p:cNvPr id="16" name="Google Shape;149;p3">
               <a:extLst>
                 <a:ext uri="{FF2B5EF4-FFF2-40B4-BE49-F238E27FC236}">
-                  <a16:creationId xmlns:a16="http://schemas.microsoft.com/office/drawing/2014/main" id="{CB166EEC-EB6E-2165-63E3-959F84E62C99}"/>
+                  <a16:creationId xmlns:a16="http://schemas.microsoft.com/office/drawing/2014/main" xmlns="" id="{CB166EEC-EB6E-2165-63E3-959F84E62C99}"/>
                 </a:ext>
               </a:extLst>
             </p:cNvPr>
@@ -6866,7 +6866,7 @@
             <p:cNvPr id="17" name="Google Shape;150;p3">
               <a:extLst>
                 <a:ext uri="{FF2B5EF4-FFF2-40B4-BE49-F238E27FC236}">
-                  <a16:creationId xmlns:a16="http://schemas.microsoft.com/office/drawing/2014/main" id="{97CDB921-18C0-3771-107E-7B5E2D6593C8}"/>
+                  <a16:creationId xmlns:a16="http://schemas.microsoft.com/office/drawing/2014/main" xmlns="" id="{97CDB921-18C0-3771-107E-7B5E2D6593C8}"/>
                 </a:ext>
               </a:extLst>
             </p:cNvPr>
@@ -6925,7 +6925,7 @@
             <p:cNvPr id="18" name="Google Shape;151;p3">
               <a:extLst>
                 <a:ext uri="{FF2B5EF4-FFF2-40B4-BE49-F238E27FC236}">
-                  <a16:creationId xmlns:a16="http://schemas.microsoft.com/office/drawing/2014/main" id="{37816837-96B3-ECC7-C253-2F98400ADDD7}"/>
+                  <a16:creationId xmlns:a16="http://schemas.microsoft.com/office/drawing/2014/main" xmlns="" id="{37816837-96B3-ECC7-C253-2F98400ADDD7}"/>
                 </a:ext>
               </a:extLst>
             </p:cNvPr>
@@ -6984,7 +6984,7 @@
             <p:cNvPr id="19" name="Google Shape;152;p3">
               <a:extLst>
                 <a:ext uri="{FF2B5EF4-FFF2-40B4-BE49-F238E27FC236}">
-                  <a16:creationId xmlns:a16="http://schemas.microsoft.com/office/drawing/2014/main" id="{5B7AA11A-BA2A-8B55-DAC1-4B2BB4E2E6FE}"/>
+                  <a16:creationId xmlns:a16="http://schemas.microsoft.com/office/drawing/2014/main" xmlns="" id="{5B7AA11A-BA2A-8B55-DAC1-4B2BB4E2E6FE}"/>
                 </a:ext>
               </a:extLst>
             </p:cNvPr>
@@ -7043,7 +7043,7 @@
             <p:cNvPr id="20" name="Google Shape;153;p3">
               <a:extLst>
                 <a:ext uri="{FF2B5EF4-FFF2-40B4-BE49-F238E27FC236}">
-                  <a16:creationId xmlns:a16="http://schemas.microsoft.com/office/drawing/2014/main" id="{198BC235-E476-8535-9201-C66D7801B49F}"/>
+                  <a16:creationId xmlns:a16="http://schemas.microsoft.com/office/drawing/2014/main" xmlns="" id="{198BC235-E476-8535-9201-C66D7801B49F}"/>
                 </a:ext>
               </a:extLst>
             </p:cNvPr>
@@ -7102,7 +7102,7 @@
             <p:cNvPr id="21" name="Google Shape;154;p3">
               <a:extLst>
                 <a:ext uri="{FF2B5EF4-FFF2-40B4-BE49-F238E27FC236}">
-                  <a16:creationId xmlns:a16="http://schemas.microsoft.com/office/drawing/2014/main" id="{9A8FAFB8-E3FC-F7F6-0EF1-58967B6B9C2E}"/>
+                  <a16:creationId xmlns:a16="http://schemas.microsoft.com/office/drawing/2014/main" xmlns="" id="{9A8FAFB8-E3FC-F7F6-0EF1-58967B6B9C2E}"/>
                 </a:ext>
               </a:extLst>
             </p:cNvPr>
@@ -7162,7 +7162,7 @@
           <p:cNvPr id="22" name="Google Shape;155;p3">
             <a:extLst>
               <a:ext uri="{FF2B5EF4-FFF2-40B4-BE49-F238E27FC236}">
-                <a16:creationId xmlns:a16="http://schemas.microsoft.com/office/drawing/2014/main" id="{2E400998-818A-2E59-01E4-20C413E79511}"/>
+                <a16:creationId xmlns:a16="http://schemas.microsoft.com/office/drawing/2014/main" xmlns="" id="{2E400998-818A-2E59-01E4-20C413E79511}"/>
               </a:ext>
             </a:extLst>
           </p:cNvPr>
@@ -7260,7 +7260,7 @@
           <p:cNvPr id="2" name="Title 1">
             <a:extLst>
               <a:ext uri="{FF2B5EF4-FFF2-40B4-BE49-F238E27FC236}">
-                <a16:creationId xmlns:a16="http://schemas.microsoft.com/office/drawing/2014/main" id="{2416A2BD-38F4-0820-3941-48610FEBB86D}"/>
+                <a16:creationId xmlns:a16="http://schemas.microsoft.com/office/drawing/2014/main" xmlns="" id="{2416A2BD-38F4-0820-3941-48610FEBB86D}"/>
               </a:ext>
             </a:extLst>
           </p:cNvPr>
@@ -7297,7 +7297,7 @@
           <p:cNvPr id="3" name="Content Placeholder 2">
             <a:extLst>
               <a:ext uri="{FF2B5EF4-FFF2-40B4-BE49-F238E27FC236}">
-                <a16:creationId xmlns:a16="http://schemas.microsoft.com/office/drawing/2014/main" id="{B17EB551-9D13-2054-7E55-5E50979A5575}"/>
+                <a16:creationId xmlns:a16="http://schemas.microsoft.com/office/drawing/2014/main" xmlns="" id="{B17EB551-9D13-2054-7E55-5E50979A5575}"/>
               </a:ext>
             </a:extLst>
           </p:cNvPr>
@@ -8151,7 +8151,7 @@
           <p:cNvPr id="2" name="Title 1">
             <a:extLst>
               <a:ext uri="{FF2B5EF4-FFF2-40B4-BE49-F238E27FC236}">
-                <a16:creationId xmlns:a16="http://schemas.microsoft.com/office/drawing/2014/main" id="{E67D167C-B00D-E5F3-5EA3-B8C24A4AFCAD}"/>
+                <a16:creationId xmlns:a16="http://schemas.microsoft.com/office/drawing/2014/main" xmlns="" id="{E67D167C-B00D-E5F3-5EA3-B8C24A4AFCAD}"/>
               </a:ext>
             </a:extLst>
           </p:cNvPr>
@@ -8184,7 +8184,7 @@
           <p:cNvPr id="4" name="Google Shape;167;p5">
             <a:extLst>
               <a:ext uri="{FF2B5EF4-FFF2-40B4-BE49-F238E27FC236}">
-                <a16:creationId xmlns:a16="http://schemas.microsoft.com/office/drawing/2014/main" id="{3BAE583F-0860-65D7-BCF5-12D3417272EF}"/>
+                <a16:creationId xmlns:a16="http://schemas.microsoft.com/office/drawing/2014/main" xmlns="" id="{3BAE583F-0860-65D7-BCF5-12D3417272EF}"/>
               </a:ext>
             </a:extLst>
           </p:cNvPr>
@@ -8202,7 +8202,7 @@
         </p:nvGraphicFramePr>
         <p:xfrm>
           <a:off x="340659" y="1790011"/>
-          <a:ext cx="11609295" cy="4180712"/>
+          <a:ext cx="11609295" cy="4193729"/>
         </p:xfrm>
         <a:graphic>
           <a:graphicData uri="http://schemas.openxmlformats.org/drawingml/2006/table">
@@ -8214,21 +8214,21 @@
                 <a:gridCol w="2967335">
                   <a:extLst>
                     <a:ext uri="{9D8B030D-6E8A-4147-A177-3AD203B41FA5}">
-                      <a16:colId xmlns:a16="http://schemas.microsoft.com/office/drawing/2014/main" val="20000"/>
+                      <a16:colId xmlns:a16="http://schemas.microsoft.com/office/drawing/2014/main" xmlns="" val="20000"/>
                     </a:ext>
                   </a:extLst>
                 </a:gridCol>
                 <a:gridCol w="7232582">
                   <a:extLst>
                     <a:ext uri="{9D8B030D-6E8A-4147-A177-3AD203B41FA5}">
-                      <a16:colId xmlns:a16="http://schemas.microsoft.com/office/drawing/2014/main" val="20001"/>
+                      <a16:colId xmlns:a16="http://schemas.microsoft.com/office/drawing/2014/main" xmlns="" val="20001"/>
                     </a:ext>
                   </a:extLst>
                 </a:gridCol>
                 <a:gridCol w="1409378">
                   <a:extLst>
                     <a:ext uri="{9D8B030D-6E8A-4147-A177-3AD203B41FA5}">
-                      <a16:colId xmlns:a16="http://schemas.microsoft.com/office/drawing/2014/main" val="20002"/>
+                      <a16:colId xmlns:a16="http://schemas.microsoft.com/office/drawing/2014/main" xmlns="" val="20002"/>
                     </a:ext>
                   </a:extLst>
                 </a:gridCol>
@@ -8460,7 +8460,7 @@
                 </a:tc>
                 <a:extLst>
                   <a:ext uri="{0D108BD9-81ED-4DB2-BD59-A6C34878D82A}">
-                    <a16:rowId xmlns:a16="http://schemas.microsoft.com/office/drawing/2014/main" val="10000"/>
+                    <a16:rowId xmlns:a16="http://schemas.microsoft.com/office/drawing/2014/main" xmlns="" val="10000"/>
                   </a:ext>
                 </a:extLst>
               </a:tr>
@@ -8628,7 +8628,7 @@
                 </a:tc>
                 <a:extLst>
                   <a:ext uri="{0D108BD9-81ED-4DB2-BD59-A6C34878D82A}">
-                    <a16:rowId xmlns:a16="http://schemas.microsoft.com/office/drawing/2014/main" val="10001"/>
+                    <a16:rowId xmlns:a16="http://schemas.microsoft.com/office/drawing/2014/main" xmlns="" val="10001"/>
                   </a:ext>
                 </a:extLst>
               </a:tr>
@@ -8913,7 +8913,7 @@
                 </a:tc>
                 <a:extLst>
                   <a:ext uri="{0D108BD9-81ED-4DB2-BD59-A6C34878D82A}">
-                    <a16:rowId xmlns:a16="http://schemas.microsoft.com/office/drawing/2014/main" val="10002"/>
+                    <a16:rowId xmlns:a16="http://schemas.microsoft.com/office/drawing/2014/main" xmlns="" val="10002"/>
                   </a:ext>
                 </a:extLst>
               </a:tr>
@@ -9230,7 +9230,7 @@
                 </a:tc>
                 <a:extLst>
                   <a:ext uri="{0D108BD9-81ED-4DB2-BD59-A6C34878D82A}">
-                    <a16:rowId xmlns:a16="http://schemas.microsoft.com/office/drawing/2014/main" val="10003"/>
+                    <a16:rowId xmlns:a16="http://schemas.microsoft.com/office/drawing/2014/main" xmlns="" val="10003"/>
                   </a:ext>
                 </a:extLst>
               </a:tr>
@@ -9273,7 +9273,7 @@
           <p:cNvPr id="2" name="Title 1">
             <a:extLst>
               <a:ext uri="{FF2B5EF4-FFF2-40B4-BE49-F238E27FC236}">
-                <a16:creationId xmlns:a16="http://schemas.microsoft.com/office/drawing/2014/main" id="{0A82DA74-C4AF-8417-0472-D9DE528D88FE}"/>
+                <a16:creationId xmlns:a16="http://schemas.microsoft.com/office/drawing/2014/main" xmlns="" id="{0A82DA74-C4AF-8417-0472-D9DE528D88FE}"/>
               </a:ext>
             </a:extLst>
           </p:cNvPr>
@@ -9311,7 +9311,7 @@
           <p:cNvPr id="3" name="Content Placeholder 2">
             <a:extLst>
               <a:ext uri="{FF2B5EF4-FFF2-40B4-BE49-F238E27FC236}">
-                <a16:creationId xmlns:a16="http://schemas.microsoft.com/office/drawing/2014/main" id="{BB84B5E3-6821-CF73-091C-7DFCC3503990}"/>
+                <a16:creationId xmlns:a16="http://schemas.microsoft.com/office/drawing/2014/main" xmlns="" id="{BB84B5E3-6821-CF73-091C-7DFCC3503990}"/>
               </a:ext>
             </a:extLst>
           </p:cNvPr>
@@ -9380,18 +9380,50 @@
                 <a:ea typeface="Calibri" panose="020F0502020204030204" pitchFamily="34" charset="0"/>
                 <a:cs typeface="Times New Roman" panose="02020603050405020304" pitchFamily="18" charset="0"/>
               </a:rPr>
-              <a:t> data primer yang kami </a:t>
-            </a:r>
-            <a:r>
-              <a:rPr lang="en-US" sz="2000" dirty="0" err="1">
+              <a:t> </a:t>
+            </a:r>
+            <a:r>
+              <a:rPr lang="en-US" sz="2000" dirty="0" smtClean="0">
                 <a:effectLst/>
                 <a:ea typeface="Calibri" panose="020F0502020204030204" pitchFamily="34" charset="0"/>
                 <a:cs typeface="Times New Roman" panose="02020603050405020304" pitchFamily="18" charset="0"/>
               </a:rPr>
-              <a:t>daopatkan</a:t>
+              <a:t>data </a:t>
+            </a:r>
+            <a:r>
+              <a:rPr lang="en-US" sz="2000" dirty="0" err="1" smtClean="0">
+                <a:effectLst/>
+                <a:ea typeface="Calibri" panose="020F0502020204030204" pitchFamily="34" charset="0"/>
+                <a:cs typeface="Times New Roman" panose="02020603050405020304" pitchFamily="18" charset="0"/>
+              </a:rPr>
+              <a:t>sekunder</a:t>
+            </a:r>
+            <a:r>
+              <a:rPr lang="en-US" sz="2000" dirty="0" smtClean="0">
+                <a:effectLst/>
+                <a:ea typeface="Calibri" panose="020F0502020204030204" pitchFamily="34" charset="0"/>
+                <a:cs typeface="Times New Roman" panose="02020603050405020304" pitchFamily="18" charset="0"/>
+              </a:rPr>
+              <a:t> </a:t>
             </a:r>
             <a:r>
               <a:rPr lang="en-US" sz="2000" dirty="0">
+                <a:effectLst/>
+                <a:ea typeface="Calibri" panose="020F0502020204030204" pitchFamily="34" charset="0"/>
+                <a:cs typeface="Times New Roman" panose="02020603050405020304" pitchFamily="18" charset="0"/>
+              </a:rPr>
+              <a:t>yang kami </a:t>
+            </a:r>
+            <a:r>
+              <a:rPr lang="en-US" sz="2000" dirty="0" err="1" smtClean="0">
+                <a:effectLst/>
+                <a:ea typeface="Calibri" panose="020F0502020204030204" pitchFamily="34" charset="0"/>
+                <a:cs typeface="Times New Roman" panose="02020603050405020304" pitchFamily="18" charset="0"/>
+              </a:rPr>
+              <a:t>dapatkan</a:t>
+            </a:r>
+            <a:r>
+              <a:rPr lang="en-US" sz="2000" dirty="0" smtClean="0">
                 <a:effectLst/>
                 <a:ea typeface="Calibri" panose="020F0502020204030204" pitchFamily="34" charset="0"/>
                 <a:cs typeface="Times New Roman" panose="02020603050405020304" pitchFamily="18" charset="0"/>
@@ -10106,7 +10138,7 @@
           <p:cNvPr id="2" name="Title 1">
             <a:extLst>
               <a:ext uri="{FF2B5EF4-FFF2-40B4-BE49-F238E27FC236}">
-                <a16:creationId xmlns:a16="http://schemas.microsoft.com/office/drawing/2014/main" id="{0C74F814-F235-BBEA-208E-F5E570363EF2}"/>
+                <a16:creationId xmlns:a16="http://schemas.microsoft.com/office/drawing/2014/main" xmlns="" id="{0C74F814-F235-BBEA-208E-F5E570363EF2}"/>
               </a:ext>
             </a:extLst>
           </p:cNvPr>
@@ -10139,7 +10171,7 @@
           <p:cNvPr id="3" name="Content Placeholder 2">
             <a:extLst>
               <a:ext uri="{FF2B5EF4-FFF2-40B4-BE49-F238E27FC236}">
-                <a16:creationId xmlns:a16="http://schemas.microsoft.com/office/drawing/2014/main" id="{3F0C4A1F-3D34-1716-207D-D12F8A94D3AA}"/>
+                <a16:creationId xmlns:a16="http://schemas.microsoft.com/office/drawing/2014/main" xmlns="" id="{3F0C4A1F-3D34-1716-207D-D12F8A94D3AA}"/>
               </a:ext>
             </a:extLst>
           </p:cNvPr>
@@ -10167,7 +10199,19 @@
             </a:r>
             <a:r>
               <a:rPr lang="en-ID" dirty="0"/>
-              <a:t> data primer </a:t>
+              <a:t> </a:t>
+            </a:r>
+            <a:r>
+              <a:rPr lang="en-ID" dirty="0" smtClean="0"/>
+              <a:t>data </a:t>
+            </a:r>
+            <a:r>
+              <a:rPr lang="en-ID" dirty="0" err="1" smtClean="0"/>
+              <a:t>sekunder</a:t>
+            </a:r>
+            <a:r>
+              <a:rPr lang="en-ID" dirty="0" smtClean="0"/>
+              <a:t> </a:t>
             </a:r>
             <a:r>
               <a:rPr lang="en-ID" dirty="0" err="1"/>
@@ -10324,7 +10368,7 @@
           <p:cNvPr id="4" name="Content Placeholder 2">
             <a:extLst>
               <a:ext uri="{FF2B5EF4-FFF2-40B4-BE49-F238E27FC236}">
-                <a16:creationId xmlns:a16="http://schemas.microsoft.com/office/drawing/2014/main" id="{B39DCED8-C251-8E6E-B662-9F2093EDCB8E}"/>
+                <a16:creationId xmlns:a16="http://schemas.microsoft.com/office/drawing/2014/main" xmlns="" id="{B39DCED8-C251-8E6E-B662-9F2093EDCB8E}"/>
               </a:ext>
             </a:extLst>
           </p:cNvPr>
@@ -10585,7 +10629,7 @@
           <p:cNvPr id="2" name="Title 1">
             <a:extLst>
               <a:ext uri="{FF2B5EF4-FFF2-40B4-BE49-F238E27FC236}">
-                <a16:creationId xmlns:a16="http://schemas.microsoft.com/office/drawing/2014/main" id="{7B5E1173-1C63-04B4-E207-A9AC1893D4A4}"/>
+                <a16:creationId xmlns:a16="http://schemas.microsoft.com/office/drawing/2014/main" xmlns="" id="{7B5E1173-1C63-04B4-E207-A9AC1893D4A4}"/>
               </a:ext>
             </a:extLst>
           </p:cNvPr>
@@ -10614,7 +10658,7 @@
           <p:cNvPr id="3" name="Content Placeholder 2">
             <a:extLst>
               <a:ext uri="{FF2B5EF4-FFF2-40B4-BE49-F238E27FC236}">
-                <a16:creationId xmlns:a16="http://schemas.microsoft.com/office/drawing/2014/main" id="{803124FB-B6A2-E722-C65D-654B943306BB}"/>
+                <a16:creationId xmlns:a16="http://schemas.microsoft.com/office/drawing/2014/main" xmlns="" id="{803124FB-B6A2-E722-C65D-654B943306BB}"/>
               </a:ext>
             </a:extLst>
           </p:cNvPr>
@@ -10781,7 +10825,7 @@
           <p:cNvPr id="4" name="Google Shape;187;p8">
             <a:extLst>
               <a:ext uri="{FF2B5EF4-FFF2-40B4-BE49-F238E27FC236}">
-                <a16:creationId xmlns:a16="http://schemas.microsoft.com/office/drawing/2014/main" id="{FE84E84A-E1AC-67CE-5029-40E913325FBB}"/>
+                <a16:creationId xmlns:a16="http://schemas.microsoft.com/office/drawing/2014/main" xmlns="" id="{FE84E84A-E1AC-67CE-5029-40E913325FBB}"/>
               </a:ext>
             </a:extLst>
           </p:cNvPr>
@@ -10810,28 +10854,28 @@
                 <a:gridCol w="335588">
                   <a:extLst>
                     <a:ext uri="{9D8B030D-6E8A-4147-A177-3AD203B41FA5}">
-                      <a16:colId xmlns:a16="http://schemas.microsoft.com/office/drawing/2014/main" val="20000"/>
+                      <a16:colId xmlns:a16="http://schemas.microsoft.com/office/drawing/2014/main" xmlns="" val="20000"/>
                     </a:ext>
                   </a:extLst>
                 </a:gridCol>
                 <a:gridCol w="2586551">
                   <a:extLst>
                     <a:ext uri="{9D8B030D-6E8A-4147-A177-3AD203B41FA5}">
-                      <a16:colId xmlns:a16="http://schemas.microsoft.com/office/drawing/2014/main" val="20001"/>
+                      <a16:colId xmlns:a16="http://schemas.microsoft.com/office/drawing/2014/main" xmlns="" val="20001"/>
                     </a:ext>
                   </a:extLst>
                 </a:gridCol>
                 <a:gridCol w="2442614">
                   <a:extLst>
                     <a:ext uri="{9D8B030D-6E8A-4147-A177-3AD203B41FA5}">
-                      <a16:colId xmlns:a16="http://schemas.microsoft.com/office/drawing/2014/main" val="20002"/>
+                      <a16:colId xmlns:a16="http://schemas.microsoft.com/office/drawing/2014/main" xmlns="" val="20002"/>
                     </a:ext>
                   </a:extLst>
                 </a:gridCol>
                 <a:gridCol w="3016304">
                   <a:extLst>
                     <a:ext uri="{9D8B030D-6E8A-4147-A177-3AD203B41FA5}">
-                      <a16:colId xmlns:a16="http://schemas.microsoft.com/office/drawing/2014/main" val="20003"/>
+                      <a16:colId xmlns:a16="http://schemas.microsoft.com/office/drawing/2014/main" xmlns="" val="20003"/>
                     </a:ext>
                   </a:extLst>
                 </a:gridCol>
@@ -10963,7 +11007,7 @@
                 </a:tc>
                 <a:extLst>
                   <a:ext uri="{0D108BD9-81ED-4DB2-BD59-A6C34878D82A}">
-                    <a16:rowId xmlns:a16="http://schemas.microsoft.com/office/drawing/2014/main" val="10000"/>
+                    <a16:rowId xmlns:a16="http://schemas.microsoft.com/office/drawing/2014/main" xmlns="" val="10000"/>
                   </a:ext>
                 </a:extLst>
               </a:tr>
@@ -11109,7 +11153,7 @@
                 </a:tc>
                 <a:extLst>
                   <a:ext uri="{0D108BD9-81ED-4DB2-BD59-A6C34878D82A}">
-                    <a16:rowId xmlns:a16="http://schemas.microsoft.com/office/drawing/2014/main" val="10001"/>
+                    <a16:rowId xmlns:a16="http://schemas.microsoft.com/office/drawing/2014/main" xmlns="" val="10001"/>
                   </a:ext>
                 </a:extLst>
               </a:tr>
@@ -11255,7 +11299,7 @@
                 </a:tc>
                 <a:extLst>
                   <a:ext uri="{0D108BD9-81ED-4DB2-BD59-A6C34878D82A}">
-                    <a16:rowId xmlns:a16="http://schemas.microsoft.com/office/drawing/2014/main" val="10002"/>
+                    <a16:rowId xmlns:a16="http://schemas.microsoft.com/office/drawing/2014/main" xmlns="" val="10002"/>
                   </a:ext>
                 </a:extLst>
               </a:tr>
@@ -11395,7 +11439,7 @@
                 </a:tc>
                 <a:extLst>
                   <a:ext uri="{0D108BD9-81ED-4DB2-BD59-A6C34878D82A}">
-                    <a16:rowId xmlns:a16="http://schemas.microsoft.com/office/drawing/2014/main" val="10003"/>
+                    <a16:rowId xmlns:a16="http://schemas.microsoft.com/office/drawing/2014/main" xmlns="" val="10003"/>
                   </a:ext>
                 </a:extLst>
               </a:tr>
@@ -11535,7 +11579,7 @@
                 </a:tc>
                 <a:extLst>
                   <a:ext uri="{0D108BD9-81ED-4DB2-BD59-A6C34878D82A}">
-                    <a16:rowId xmlns:a16="http://schemas.microsoft.com/office/drawing/2014/main" val="10004"/>
+                    <a16:rowId xmlns:a16="http://schemas.microsoft.com/office/drawing/2014/main" xmlns="" val="10004"/>
                   </a:ext>
                 </a:extLst>
               </a:tr>
@@ -11675,7 +11719,7 @@
                 </a:tc>
                 <a:extLst>
                   <a:ext uri="{0D108BD9-81ED-4DB2-BD59-A6C34878D82A}">
-                    <a16:rowId xmlns:a16="http://schemas.microsoft.com/office/drawing/2014/main" val="10005"/>
+                    <a16:rowId xmlns:a16="http://schemas.microsoft.com/office/drawing/2014/main" xmlns="" val="10005"/>
                   </a:ext>
                 </a:extLst>
               </a:tr>
@@ -11815,7 +11859,7 @@
                 </a:tc>
                 <a:extLst>
                   <a:ext uri="{0D108BD9-81ED-4DB2-BD59-A6C34878D82A}">
-                    <a16:rowId xmlns:a16="http://schemas.microsoft.com/office/drawing/2014/main" val="10006"/>
+                    <a16:rowId xmlns:a16="http://schemas.microsoft.com/office/drawing/2014/main" xmlns="" val="10006"/>
                   </a:ext>
                 </a:extLst>
               </a:tr>
@@ -11955,7 +11999,7 @@
                 </a:tc>
                 <a:extLst>
                   <a:ext uri="{0D108BD9-81ED-4DB2-BD59-A6C34878D82A}">
-                    <a16:rowId xmlns:a16="http://schemas.microsoft.com/office/drawing/2014/main" val="10007"/>
+                    <a16:rowId xmlns:a16="http://schemas.microsoft.com/office/drawing/2014/main" xmlns="" val="10007"/>
                   </a:ext>
                 </a:extLst>
               </a:tr>
@@ -12099,7 +12143,7 @@
                 </a:tc>
                 <a:extLst>
                   <a:ext uri="{0D108BD9-81ED-4DB2-BD59-A6C34878D82A}">
-                    <a16:rowId xmlns:a16="http://schemas.microsoft.com/office/drawing/2014/main" val="10008"/>
+                    <a16:rowId xmlns:a16="http://schemas.microsoft.com/office/drawing/2014/main" xmlns="" val="10008"/>
                   </a:ext>
                 </a:extLst>
               </a:tr>
@@ -12243,7 +12287,7 @@
                 </a:tc>
                 <a:extLst>
                   <a:ext uri="{0D108BD9-81ED-4DB2-BD59-A6C34878D82A}">
-                    <a16:rowId xmlns:a16="http://schemas.microsoft.com/office/drawing/2014/main" val="10009"/>
+                    <a16:rowId xmlns:a16="http://schemas.microsoft.com/office/drawing/2014/main" xmlns="" val="10009"/>
                   </a:ext>
                 </a:extLst>
               </a:tr>
@@ -12286,7 +12330,7 @@
           <p:cNvPr id="2" name="Title 1">
             <a:extLst>
               <a:ext uri="{FF2B5EF4-FFF2-40B4-BE49-F238E27FC236}">
-                <a16:creationId xmlns:a16="http://schemas.microsoft.com/office/drawing/2014/main" id="{CC211ED0-0B79-BF08-D16C-2DEAF41E07E4}"/>
+                <a16:creationId xmlns:a16="http://schemas.microsoft.com/office/drawing/2014/main" xmlns="" id="{CC211ED0-0B79-BF08-D16C-2DEAF41E07E4}"/>
               </a:ext>
             </a:extLst>
           </p:cNvPr>
@@ -12315,7 +12359,7 @@
           <p:cNvPr id="4" name="Google Shape;194;p9">
             <a:extLst>
               <a:ext uri="{FF2B5EF4-FFF2-40B4-BE49-F238E27FC236}">
-                <a16:creationId xmlns:a16="http://schemas.microsoft.com/office/drawing/2014/main" id="{47333771-02F8-6175-D2A5-1297CEC56929}"/>
+                <a16:creationId xmlns:a16="http://schemas.microsoft.com/office/drawing/2014/main" xmlns="" id="{47333771-02F8-6175-D2A5-1297CEC56929}"/>
               </a:ext>
             </a:extLst>
           </p:cNvPr>
@@ -12335,7 +12379,7 @@
             <p:cNvPr id="5" name="Google Shape;195;p9">
               <a:extLst>
                 <a:ext uri="{FF2B5EF4-FFF2-40B4-BE49-F238E27FC236}">
-                  <a16:creationId xmlns:a16="http://schemas.microsoft.com/office/drawing/2014/main" id="{D4C4B2B0-B550-EDC8-DB78-3F409FEDCA25}"/>
+                  <a16:creationId xmlns:a16="http://schemas.microsoft.com/office/drawing/2014/main" xmlns="" id="{D4C4B2B0-B550-EDC8-DB78-3F409FEDCA25}"/>
                 </a:ext>
               </a:extLst>
             </p:cNvPr>
@@ -12394,7 +12438,7 @@
             <p:cNvPr id="6" name="Google Shape;196;p9">
               <a:extLst>
                 <a:ext uri="{FF2B5EF4-FFF2-40B4-BE49-F238E27FC236}">
-                  <a16:creationId xmlns:a16="http://schemas.microsoft.com/office/drawing/2014/main" id="{02238B1B-AA24-3E08-91FC-423E076FB2FA}"/>
+                  <a16:creationId xmlns:a16="http://schemas.microsoft.com/office/drawing/2014/main" xmlns="" id="{02238B1B-AA24-3E08-91FC-423E076FB2FA}"/>
                 </a:ext>
               </a:extLst>
             </p:cNvPr>
@@ -12466,7 +12510,7 @@
             <p:cNvPr id="7" name="Google Shape;197;p9">
               <a:extLst>
                 <a:ext uri="{FF2B5EF4-FFF2-40B4-BE49-F238E27FC236}">
-                  <a16:creationId xmlns:a16="http://schemas.microsoft.com/office/drawing/2014/main" id="{FC2BFD9E-5963-593D-CAB3-EF069814973A}"/>
+                  <a16:creationId xmlns:a16="http://schemas.microsoft.com/office/drawing/2014/main" xmlns="" id="{FC2BFD9E-5963-593D-CAB3-EF069814973A}"/>
                 </a:ext>
               </a:extLst>
             </p:cNvPr>
@@ -12535,7 +12579,7 @@
             <p:cNvPr id="8" name="Google Shape;198;p9">
               <a:extLst>
                 <a:ext uri="{FF2B5EF4-FFF2-40B4-BE49-F238E27FC236}">
-                  <a16:creationId xmlns:a16="http://schemas.microsoft.com/office/drawing/2014/main" id="{3D6B1E18-FF5D-2A21-322D-286B86F342F8}"/>
+                  <a16:creationId xmlns:a16="http://schemas.microsoft.com/office/drawing/2014/main" xmlns="" id="{3D6B1E18-FF5D-2A21-322D-286B86F342F8}"/>
                 </a:ext>
               </a:extLst>
             </p:cNvPr>
@@ -12594,7 +12638,7 @@
             <p:cNvPr id="9" name="Google Shape;199;p9">
               <a:extLst>
                 <a:ext uri="{FF2B5EF4-FFF2-40B4-BE49-F238E27FC236}">
-                  <a16:creationId xmlns:a16="http://schemas.microsoft.com/office/drawing/2014/main" id="{CB8F3412-4D4C-66E1-EA18-F6D196113FFE}"/>
+                  <a16:creationId xmlns:a16="http://schemas.microsoft.com/office/drawing/2014/main" xmlns="" id="{CB8F3412-4D4C-66E1-EA18-F6D196113FFE}"/>
                 </a:ext>
               </a:extLst>
             </p:cNvPr>
@@ -12658,7 +12702,7 @@
             <p:cNvPr id="10" name="Google Shape;200;p9">
               <a:extLst>
                 <a:ext uri="{FF2B5EF4-FFF2-40B4-BE49-F238E27FC236}">
-                  <a16:creationId xmlns:a16="http://schemas.microsoft.com/office/drawing/2014/main" id="{A1DBBC0C-A2BE-1548-C4B6-751D3333DFD1}"/>
+                  <a16:creationId xmlns:a16="http://schemas.microsoft.com/office/drawing/2014/main" xmlns="" id="{A1DBBC0C-A2BE-1548-C4B6-751D3333DFD1}"/>
                 </a:ext>
               </a:extLst>
             </p:cNvPr>
@@ -12724,7 +12768,7 @@
             <p:cNvPr id="11" name="Google Shape;201;p9">
               <a:extLst>
                 <a:ext uri="{FF2B5EF4-FFF2-40B4-BE49-F238E27FC236}">
-                  <a16:creationId xmlns:a16="http://schemas.microsoft.com/office/drawing/2014/main" id="{8999FB44-26F1-4F8B-9CDE-12453D9A825A}"/>
+                  <a16:creationId xmlns:a16="http://schemas.microsoft.com/office/drawing/2014/main" xmlns="" id="{8999FB44-26F1-4F8B-9CDE-12453D9A825A}"/>
                 </a:ext>
               </a:extLst>
             </p:cNvPr>
@@ -12783,7 +12827,7 @@
             <p:cNvPr id="12" name="Google Shape;202;p9">
               <a:extLst>
                 <a:ext uri="{FF2B5EF4-FFF2-40B4-BE49-F238E27FC236}">
-                  <a16:creationId xmlns:a16="http://schemas.microsoft.com/office/drawing/2014/main" id="{9603F816-13E2-25C3-74BA-4D00C6B0257A}"/>
+                  <a16:creationId xmlns:a16="http://schemas.microsoft.com/office/drawing/2014/main" xmlns="" id="{9603F816-13E2-25C3-74BA-4D00C6B0257A}"/>
                 </a:ext>
               </a:extLst>
             </p:cNvPr>
@@ -12867,7 +12911,7 @@
             <p:cNvPr id="13" name="Google Shape;203;p9">
               <a:extLst>
                 <a:ext uri="{FF2B5EF4-FFF2-40B4-BE49-F238E27FC236}">
-                  <a16:creationId xmlns:a16="http://schemas.microsoft.com/office/drawing/2014/main" id="{B85479E6-63D8-A01B-2AEC-95EA40E8DE94}"/>
+                  <a16:creationId xmlns:a16="http://schemas.microsoft.com/office/drawing/2014/main" xmlns="" id="{B85479E6-63D8-A01B-2AEC-95EA40E8DE94}"/>
                 </a:ext>
               </a:extLst>
             </p:cNvPr>
@@ -12933,7 +12977,7 @@
             <p:cNvPr id="14" name="Google Shape;204;p9">
               <a:extLst>
                 <a:ext uri="{FF2B5EF4-FFF2-40B4-BE49-F238E27FC236}">
-                  <a16:creationId xmlns:a16="http://schemas.microsoft.com/office/drawing/2014/main" id="{1012D8E4-90C6-C3F6-6A00-5F340AB82DD2}"/>
+                  <a16:creationId xmlns:a16="http://schemas.microsoft.com/office/drawing/2014/main" xmlns="" id="{1012D8E4-90C6-C3F6-6A00-5F340AB82DD2}"/>
                 </a:ext>
               </a:extLst>
             </p:cNvPr>
@@ -12992,7 +13036,7 @@
             <p:cNvPr id="15" name="Google Shape;205;p9">
               <a:extLst>
                 <a:ext uri="{FF2B5EF4-FFF2-40B4-BE49-F238E27FC236}">
-                  <a16:creationId xmlns:a16="http://schemas.microsoft.com/office/drawing/2014/main" id="{456AA46D-0BBD-B6A5-A702-9819AC36834B}"/>
+                  <a16:creationId xmlns:a16="http://schemas.microsoft.com/office/drawing/2014/main" xmlns="" id="{456AA46D-0BBD-B6A5-A702-9819AC36834B}"/>
                 </a:ext>
               </a:extLst>
             </p:cNvPr>
@@ -13076,7 +13120,7 @@
             <p:cNvPr id="16" name="Google Shape;206;p9">
               <a:extLst>
                 <a:ext uri="{FF2B5EF4-FFF2-40B4-BE49-F238E27FC236}">
-                  <a16:creationId xmlns:a16="http://schemas.microsoft.com/office/drawing/2014/main" id="{93982CAF-E2DC-7ACF-C354-56CB23EA89A4}"/>
+                  <a16:creationId xmlns:a16="http://schemas.microsoft.com/office/drawing/2014/main" xmlns="" id="{93982CAF-E2DC-7ACF-C354-56CB23EA89A4}"/>
                 </a:ext>
               </a:extLst>
             </p:cNvPr>
@@ -13145,7 +13189,7 @@
             <p:cNvPr id="17" name="Google Shape;207;p9">
               <a:extLst>
                 <a:ext uri="{FF2B5EF4-FFF2-40B4-BE49-F238E27FC236}">
-                  <a16:creationId xmlns:a16="http://schemas.microsoft.com/office/drawing/2014/main" id="{899C683F-90B6-828F-7291-B547C066DADB}"/>
+                  <a16:creationId xmlns:a16="http://schemas.microsoft.com/office/drawing/2014/main" xmlns="" id="{899C683F-90B6-828F-7291-B547C066DADB}"/>
                 </a:ext>
               </a:extLst>
             </p:cNvPr>
@@ -13204,7 +13248,7 @@
             <p:cNvPr id="18" name="Google Shape;208;p9">
               <a:extLst>
                 <a:ext uri="{FF2B5EF4-FFF2-40B4-BE49-F238E27FC236}">
-                  <a16:creationId xmlns:a16="http://schemas.microsoft.com/office/drawing/2014/main" id="{8FCC2D91-2BEF-01D2-BD5E-A4B6F1F0B467}"/>
+                  <a16:creationId xmlns:a16="http://schemas.microsoft.com/office/drawing/2014/main" xmlns="" id="{8FCC2D91-2BEF-01D2-BD5E-A4B6F1F0B467}"/>
                 </a:ext>
               </a:extLst>
             </p:cNvPr>
@@ -13276,7 +13320,7 @@
             <p:cNvPr id="19" name="Google Shape;209;p9">
               <a:extLst>
                 <a:ext uri="{FF2B5EF4-FFF2-40B4-BE49-F238E27FC236}">
-                  <a16:creationId xmlns:a16="http://schemas.microsoft.com/office/drawing/2014/main" id="{EE084F64-4136-761B-5717-EC411B867BF4}"/>
+                  <a16:creationId xmlns:a16="http://schemas.microsoft.com/office/drawing/2014/main" xmlns="" id="{EE084F64-4136-761B-5717-EC411B867BF4}"/>
                 </a:ext>
               </a:extLst>
             </p:cNvPr>
@@ -13346,7 +13390,7 @@
           <p:cNvPr id="21" name="Google Shape;213;p9" descr="C:\Users\hends\AppData\Local\Temp\maftemp-743b1407\1368553971380_822\1360736259772_681\index_files\Data_types.png">
             <a:extLst>
               <a:ext uri="{FF2B5EF4-FFF2-40B4-BE49-F238E27FC236}">
-                <a16:creationId xmlns:a16="http://schemas.microsoft.com/office/drawing/2014/main" id="{90FCB336-DE63-E0BD-EF36-C43C4393A8C4}"/>
+                <a16:creationId xmlns:a16="http://schemas.microsoft.com/office/drawing/2014/main" xmlns="" id="{90FCB336-DE63-E0BD-EF36-C43C4393A8C4}"/>
               </a:ext>
             </a:extLst>
           </p:cNvPr>
@@ -13379,7 +13423,7 @@
           <p:cNvPr id="3" name="TextBox 2">
             <a:extLst>
               <a:ext uri="{FF2B5EF4-FFF2-40B4-BE49-F238E27FC236}">
-                <a16:creationId xmlns:a16="http://schemas.microsoft.com/office/drawing/2014/main" id="{954AE85C-3AAB-9E87-D6D5-6D7EA0D0ADAF}"/>
+                <a16:creationId xmlns:a16="http://schemas.microsoft.com/office/drawing/2014/main" xmlns="" id="{954AE85C-3AAB-9E87-D6D5-6D7EA0D0ADAF}"/>
               </a:ext>
             </a:extLst>
           </p:cNvPr>
@@ -13619,7 +13663,7 @@
           <p:cNvPr id="23" name="TextBox 22">
             <a:extLst>
               <a:ext uri="{FF2B5EF4-FFF2-40B4-BE49-F238E27FC236}">
-                <a16:creationId xmlns:a16="http://schemas.microsoft.com/office/drawing/2014/main" id="{095CDA52-5F48-4311-C7A5-F59E00899A8E}"/>
+                <a16:creationId xmlns:a16="http://schemas.microsoft.com/office/drawing/2014/main" xmlns="" id="{095CDA52-5F48-4311-C7A5-F59E00899A8E}"/>
               </a:ext>
             </a:extLst>
           </p:cNvPr>
@@ -13782,7 +13826,7 @@
           <p:cNvPr id="2" name="Title 1">
             <a:extLst>
               <a:ext uri="{FF2B5EF4-FFF2-40B4-BE49-F238E27FC236}">
-                <a16:creationId xmlns:a16="http://schemas.microsoft.com/office/drawing/2014/main" id="{D48CF0E1-0220-79EB-AF1C-E7459DEE3028}"/>
+                <a16:creationId xmlns:a16="http://schemas.microsoft.com/office/drawing/2014/main" xmlns="" id="{D48CF0E1-0220-79EB-AF1C-E7459DEE3028}"/>
               </a:ext>
             </a:extLst>
           </p:cNvPr>
@@ -13815,7 +13859,7 @@
           <p:cNvPr id="3" name="Content Placeholder 2">
             <a:extLst>
               <a:ext uri="{FF2B5EF4-FFF2-40B4-BE49-F238E27FC236}">
-                <a16:creationId xmlns:a16="http://schemas.microsoft.com/office/drawing/2014/main" id="{77D1EE6E-CE4D-155F-49D4-967A7C363933}"/>
+                <a16:creationId xmlns:a16="http://schemas.microsoft.com/office/drawing/2014/main" xmlns="" id="{77D1EE6E-CE4D-155F-49D4-967A7C363933}"/>
               </a:ext>
             </a:extLst>
           </p:cNvPr>

</xml_diff>